<commit_message>
bug fix and doc update
</commit_message>
<xml_diff>
--- a/docs/images/agentic-coworker.pptx
+++ b/docs/images/agentic-coworker.pptx
@@ -4,8 +4,16 @@
   <p:sldMasterIdLst>
     <p:sldMasterId id="2147483648" r:id="rId1"/>
   </p:sldMasterIdLst>
+  <p:notesMasterIdLst>
+    <p:notesMasterId r:id="rId8"/>
+  </p:notesMasterIdLst>
   <p:sldIdLst>
     <p:sldId id="257" r:id="rId2"/>
+    <p:sldId id="256" r:id="rId3"/>
+    <p:sldId id="258" r:id="rId4"/>
+    <p:sldId id="259" r:id="rId5"/>
+    <p:sldId id="260" r:id="rId6"/>
+    <p:sldId id="261" r:id="rId7"/>
   </p:sldIdLst>
   <p:sldSz cx="12192000" cy="6858000"/>
   <p:notesSz cx="6858000" cy="9144000"/>
@@ -112,6 +120,439 @@
 </p:presentation>
 </file>
 
+<file path=ppt/notesMasters/notesMaster1.xml><?xml version="1.0" encoding="utf-8"?>
+<p:notesMaster xmlns:a="http://schemas.openxmlformats.org/drawingml/2006/main" xmlns:r="http://schemas.openxmlformats.org/officeDocument/2006/relationships" xmlns:p="http://schemas.openxmlformats.org/presentationml/2006/main">
+  <p:cSld>
+    <p:bg>
+      <p:bgRef idx="1001">
+        <a:schemeClr val="bg1"/>
+      </p:bgRef>
+    </p:bg>
+    <p:spTree>
+      <p:nvGrpSpPr>
+        <p:cNvPr id="1" name=""/>
+        <p:cNvGrpSpPr/>
+        <p:nvPr/>
+      </p:nvGrpSpPr>
+      <p:grpSpPr>
+        <a:xfrm>
+          <a:off x="0" y="0"/>
+          <a:ext cx="0" cy="0"/>
+          <a:chOff x="0" y="0"/>
+          <a:chExt cx="0" cy="0"/>
+        </a:xfrm>
+      </p:grpSpPr>
+      <p:sp>
+        <p:nvSpPr>
+          <p:cNvPr id="2" name="Header Placeholder 1"/>
+          <p:cNvSpPr>
+            <a:spLocks noGrp="1"/>
+          </p:cNvSpPr>
+          <p:nvPr>
+            <p:ph type="hdr" sz="quarter"/>
+          </p:nvPr>
+        </p:nvSpPr>
+        <p:spPr>
+          <a:xfrm>
+            <a:off x="0" y="0"/>
+            <a:ext cx="2971800" cy="458788"/>
+          </a:xfrm>
+          <a:prstGeom prst="rect">
+            <a:avLst/>
+          </a:prstGeom>
+        </p:spPr>
+        <p:txBody>
+          <a:bodyPr vert="horz" lIns="91440" tIns="45720" rIns="91440" bIns="45720" rtlCol="0"/>
+          <a:lstStyle>
+            <a:lvl1pPr algn="l">
+              <a:defRPr sz="1200"/>
+            </a:lvl1pPr>
+          </a:lstStyle>
+          <a:p>
+            <a:endParaRPr lang="en-US"/>
+          </a:p>
+        </p:txBody>
+      </p:sp>
+      <p:sp>
+        <p:nvSpPr>
+          <p:cNvPr id="3" name="Date Placeholder 2"/>
+          <p:cNvSpPr>
+            <a:spLocks noGrp="1"/>
+          </p:cNvSpPr>
+          <p:nvPr>
+            <p:ph type="dt" idx="1"/>
+          </p:nvPr>
+        </p:nvSpPr>
+        <p:spPr>
+          <a:xfrm>
+            <a:off x="3884613" y="0"/>
+            <a:ext cx="2971800" cy="458788"/>
+          </a:xfrm>
+          <a:prstGeom prst="rect">
+            <a:avLst/>
+          </a:prstGeom>
+        </p:spPr>
+        <p:txBody>
+          <a:bodyPr vert="horz" lIns="91440" tIns="45720" rIns="91440" bIns="45720" rtlCol="0"/>
+          <a:lstStyle>
+            <a:lvl1pPr algn="r">
+              <a:defRPr sz="1200"/>
+            </a:lvl1pPr>
+          </a:lstStyle>
+          <a:p>
+            <a:fld id="{45509D5A-D0BD-194C-9BBB-7171E0E59518}" type="datetimeFigureOut">
+              <a:rPr lang="en-US" smtClean="0"/>
+              <a:t>2/16/26</a:t>
+            </a:fld>
+            <a:endParaRPr lang="en-US"/>
+          </a:p>
+        </p:txBody>
+      </p:sp>
+      <p:sp>
+        <p:nvSpPr>
+          <p:cNvPr id="4" name="Slide Image Placeholder 3"/>
+          <p:cNvSpPr>
+            <a:spLocks noGrp="1" noRot="1" noChangeAspect="1"/>
+          </p:cNvSpPr>
+          <p:nvPr>
+            <p:ph type="sldImg" idx="2"/>
+          </p:nvPr>
+        </p:nvSpPr>
+        <p:spPr>
+          <a:xfrm>
+            <a:off x="685800" y="1143000"/>
+            <a:ext cx="5486400" cy="3086100"/>
+          </a:xfrm>
+          <a:prstGeom prst="rect">
+            <a:avLst/>
+          </a:prstGeom>
+          <a:noFill/>
+          <a:ln w="12700">
+            <a:solidFill>
+              <a:prstClr val="black"/>
+            </a:solidFill>
+          </a:ln>
+        </p:spPr>
+        <p:txBody>
+          <a:bodyPr vert="horz" lIns="91440" tIns="45720" rIns="91440" bIns="45720" rtlCol="0" anchor="ctr"/>
+          <a:lstStyle/>
+          <a:p>
+            <a:endParaRPr lang="en-US"/>
+          </a:p>
+        </p:txBody>
+      </p:sp>
+      <p:sp>
+        <p:nvSpPr>
+          <p:cNvPr id="5" name="Notes Placeholder 4"/>
+          <p:cNvSpPr>
+            <a:spLocks noGrp="1"/>
+          </p:cNvSpPr>
+          <p:nvPr>
+            <p:ph type="body" sz="quarter" idx="3"/>
+          </p:nvPr>
+        </p:nvSpPr>
+        <p:spPr>
+          <a:xfrm>
+            <a:off x="685800" y="4400550"/>
+            <a:ext cx="5486400" cy="3600450"/>
+          </a:xfrm>
+          <a:prstGeom prst="rect">
+            <a:avLst/>
+          </a:prstGeom>
+        </p:spPr>
+        <p:txBody>
+          <a:bodyPr vert="horz" lIns="91440" tIns="45720" rIns="91440" bIns="45720" rtlCol="0"/>
+          <a:lstStyle/>
+          <a:p>
+            <a:pPr lvl="0"/>
+            <a:r>
+              <a:rPr lang="en-US"/>
+              <a:t>Click to edit Master text styles</a:t>
+            </a:r>
+          </a:p>
+          <a:p>
+            <a:pPr lvl="1"/>
+            <a:r>
+              <a:rPr lang="en-US"/>
+              <a:t>Second level</a:t>
+            </a:r>
+          </a:p>
+          <a:p>
+            <a:pPr lvl="2"/>
+            <a:r>
+              <a:rPr lang="en-US"/>
+              <a:t>Third level</a:t>
+            </a:r>
+          </a:p>
+          <a:p>
+            <a:pPr lvl="3"/>
+            <a:r>
+              <a:rPr lang="en-US"/>
+              <a:t>Fourth level</a:t>
+            </a:r>
+          </a:p>
+          <a:p>
+            <a:pPr lvl="4"/>
+            <a:r>
+              <a:rPr lang="en-US"/>
+              <a:t>Fifth level</a:t>
+            </a:r>
+          </a:p>
+        </p:txBody>
+      </p:sp>
+      <p:sp>
+        <p:nvSpPr>
+          <p:cNvPr id="6" name="Footer Placeholder 5"/>
+          <p:cNvSpPr>
+            <a:spLocks noGrp="1"/>
+          </p:cNvSpPr>
+          <p:nvPr>
+            <p:ph type="ftr" sz="quarter" idx="4"/>
+          </p:nvPr>
+        </p:nvSpPr>
+        <p:spPr>
+          <a:xfrm>
+            <a:off x="0" y="8685213"/>
+            <a:ext cx="2971800" cy="458787"/>
+          </a:xfrm>
+          <a:prstGeom prst="rect">
+            <a:avLst/>
+          </a:prstGeom>
+        </p:spPr>
+        <p:txBody>
+          <a:bodyPr vert="horz" lIns="91440" tIns="45720" rIns="91440" bIns="45720" rtlCol="0" anchor="b"/>
+          <a:lstStyle>
+            <a:lvl1pPr algn="l">
+              <a:defRPr sz="1200"/>
+            </a:lvl1pPr>
+          </a:lstStyle>
+          <a:p>
+            <a:endParaRPr lang="en-US"/>
+          </a:p>
+        </p:txBody>
+      </p:sp>
+      <p:sp>
+        <p:nvSpPr>
+          <p:cNvPr id="7" name="Slide Number Placeholder 6"/>
+          <p:cNvSpPr>
+            <a:spLocks noGrp="1"/>
+          </p:cNvSpPr>
+          <p:nvPr>
+            <p:ph type="sldNum" sz="quarter" idx="5"/>
+          </p:nvPr>
+        </p:nvSpPr>
+        <p:spPr>
+          <a:xfrm>
+            <a:off x="3884613" y="8685213"/>
+            <a:ext cx="2971800" cy="458787"/>
+          </a:xfrm>
+          <a:prstGeom prst="rect">
+            <a:avLst/>
+          </a:prstGeom>
+        </p:spPr>
+        <p:txBody>
+          <a:bodyPr vert="horz" lIns="91440" tIns="45720" rIns="91440" bIns="45720" rtlCol="0" anchor="b"/>
+          <a:lstStyle>
+            <a:lvl1pPr algn="r">
+              <a:defRPr sz="1200"/>
+            </a:lvl1pPr>
+          </a:lstStyle>
+          <a:p>
+            <a:fld id="{0172F607-7DB5-9F4C-B934-3219ED8062E4}" type="slidenum">
+              <a:rPr lang="en-US" smtClean="0"/>
+              <a:t>‹#›</a:t>
+            </a:fld>
+            <a:endParaRPr lang="en-US"/>
+          </a:p>
+        </p:txBody>
+      </p:sp>
+    </p:spTree>
+    <p:extLst>
+      <p:ext uri="{BB962C8B-B14F-4D97-AF65-F5344CB8AC3E}">
+        <p14:creationId xmlns:p14="http://schemas.microsoft.com/office/powerpoint/2010/main" val="2272304594"/>
+      </p:ext>
+    </p:extLst>
+  </p:cSld>
+  <p:clrMap bg1="lt1" tx1="dk1" bg2="lt2" tx2="dk2" accent1="accent1" accent2="accent2" accent3="accent3" accent4="accent4" accent5="accent5" accent6="accent6" hlink="hlink" folHlink="folHlink"/>
+  <p:notesStyle>
+    <a:lvl1pPr marL="0" algn="l" defTabSz="914400" rtl="0" eaLnBrk="1" latinLnBrk="0" hangingPunct="1">
+      <a:defRPr sz="1200" kern="1200">
+        <a:solidFill>
+          <a:schemeClr val="tx1"/>
+        </a:solidFill>
+        <a:latin typeface="+mn-lt"/>
+        <a:ea typeface="+mn-ea"/>
+        <a:cs typeface="+mn-cs"/>
+      </a:defRPr>
+    </a:lvl1pPr>
+    <a:lvl2pPr marL="457200" algn="l" defTabSz="914400" rtl="0" eaLnBrk="1" latinLnBrk="0" hangingPunct="1">
+      <a:defRPr sz="1200" kern="1200">
+        <a:solidFill>
+          <a:schemeClr val="tx1"/>
+        </a:solidFill>
+        <a:latin typeface="+mn-lt"/>
+        <a:ea typeface="+mn-ea"/>
+        <a:cs typeface="+mn-cs"/>
+      </a:defRPr>
+    </a:lvl2pPr>
+    <a:lvl3pPr marL="914400" algn="l" defTabSz="914400" rtl="0" eaLnBrk="1" latinLnBrk="0" hangingPunct="1">
+      <a:defRPr sz="1200" kern="1200">
+        <a:solidFill>
+          <a:schemeClr val="tx1"/>
+        </a:solidFill>
+        <a:latin typeface="+mn-lt"/>
+        <a:ea typeface="+mn-ea"/>
+        <a:cs typeface="+mn-cs"/>
+      </a:defRPr>
+    </a:lvl3pPr>
+    <a:lvl4pPr marL="1371600" algn="l" defTabSz="914400" rtl="0" eaLnBrk="1" latinLnBrk="0" hangingPunct="1">
+      <a:defRPr sz="1200" kern="1200">
+        <a:solidFill>
+          <a:schemeClr val="tx1"/>
+        </a:solidFill>
+        <a:latin typeface="+mn-lt"/>
+        <a:ea typeface="+mn-ea"/>
+        <a:cs typeface="+mn-cs"/>
+      </a:defRPr>
+    </a:lvl4pPr>
+    <a:lvl5pPr marL="1828800" algn="l" defTabSz="914400" rtl="0" eaLnBrk="1" latinLnBrk="0" hangingPunct="1">
+      <a:defRPr sz="1200" kern="1200">
+        <a:solidFill>
+          <a:schemeClr val="tx1"/>
+        </a:solidFill>
+        <a:latin typeface="+mn-lt"/>
+        <a:ea typeface="+mn-ea"/>
+        <a:cs typeface="+mn-cs"/>
+      </a:defRPr>
+    </a:lvl5pPr>
+    <a:lvl6pPr marL="2286000" algn="l" defTabSz="914400" rtl="0" eaLnBrk="1" latinLnBrk="0" hangingPunct="1">
+      <a:defRPr sz="1200" kern="1200">
+        <a:solidFill>
+          <a:schemeClr val="tx1"/>
+        </a:solidFill>
+        <a:latin typeface="+mn-lt"/>
+        <a:ea typeface="+mn-ea"/>
+        <a:cs typeface="+mn-cs"/>
+      </a:defRPr>
+    </a:lvl6pPr>
+    <a:lvl7pPr marL="2743200" algn="l" defTabSz="914400" rtl="0" eaLnBrk="1" latinLnBrk="0" hangingPunct="1">
+      <a:defRPr sz="1200" kern="1200">
+        <a:solidFill>
+          <a:schemeClr val="tx1"/>
+        </a:solidFill>
+        <a:latin typeface="+mn-lt"/>
+        <a:ea typeface="+mn-ea"/>
+        <a:cs typeface="+mn-cs"/>
+      </a:defRPr>
+    </a:lvl7pPr>
+    <a:lvl8pPr marL="3200400" algn="l" defTabSz="914400" rtl="0" eaLnBrk="1" latinLnBrk="0" hangingPunct="1">
+      <a:defRPr sz="1200" kern="1200">
+        <a:solidFill>
+          <a:schemeClr val="tx1"/>
+        </a:solidFill>
+        <a:latin typeface="+mn-lt"/>
+        <a:ea typeface="+mn-ea"/>
+        <a:cs typeface="+mn-cs"/>
+      </a:defRPr>
+    </a:lvl8pPr>
+    <a:lvl9pPr marL="3657600" algn="l" defTabSz="914400" rtl="0" eaLnBrk="1" latinLnBrk="0" hangingPunct="1">
+      <a:defRPr sz="1200" kern="1200">
+        <a:solidFill>
+          <a:schemeClr val="tx1"/>
+        </a:solidFill>
+        <a:latin typeface="+mn-lt"/>
+        <a:ea typeface="+mn-ea"/>
+        <a:cs typeface="+mn-cs"/>
+      </a:defRPr>
+    </a:lvl9pPr>
+  </p:notesStyle>
+</p:notesMaster>
+</file>
+
+<file path=ppt/notesSlides/notesSlide1.xml><?xml version="1.0" encoding="utf-8"?>
+<p:notes xmlns:a="http://schemas.openxmlformats.org/drawingml/2006/main" xmlns:r="http://schemas.openxmlformats.org/officeDocument/2006/relationships" xmlns:p="http://schemas.openxmlformats.org/presentationml/2006/main">
+  <p:cSld>
+    <p:spTree>
+      <p:nvGrpSpPr>
+        <p:cNvPr id="1" name=""/>
+        <p:cNvGrpSpPr/>
+        <p:nvPr/>
+      </p:nvGrpSpPr>
+      <p:grpSpPr>
+        <a:xfrm>
+          <a:off x="0" y="0"/>
+          <a:ext cx="0" cy="0"/>
+          <a:chOff x="0" y="0"/>
+          <a:chExt cx="0" cy="0"/>
+        </a:xfrm>
+      </p:grpSpPr>
+      <p:sp>
+        <p:nvSpPr>
+          <p:cNvPr id="2" name="Slide Image Placeholder 1"/>
+          <p:cNvSpPr>
+            <a:spLocks noGrp="1" noRot="1" noChangeAspect="1"/>
+          </p:cNvSpPr>
+          <p:nvPr>
+            <p:ph type="sldImg"/>
+          </p:nvPr>
+        </p:nvSpPr>
+        <p:spPr/>
+      </p:sp>
+      <p:sp>
+        <p:nvSpPr>
+          <p:cNvPr id="3" name="Notes Placeholder 2"/>
+          <p:cNvSpPr>
+            <a:spLocks noGrp="1"/>
+          </p:cNvSpPr>
+          <p:nvPr>
+            <p:ph type="body" idx="1"/>
+          </p:nvPr>
+        </p:nvSpPr>
+        <p:spPr/>
+        <p:txBody>
+          <a:bodyPr/>
+          <a:lstStyle/>
+          <a:p>
+            <a:endParaRPr lang="en-US" dirty="0"/>
+          </a:p>
+        </p:txBody>
+      </p:sp>
+      <p:sp>
+        <p:nvSpPr>
+          <p:cNvPr id="4" name="Slide Number Placeholder 3"/>
+          <p:cNvSpPr>
+            <a:spLocks noGrp="1"/>
+          </p:cNvSpPr>
+          <p:nvPr>
+            <p:ph type="sldNum" sz="quarter" idx="10"/>
+          </p:nvPr>
+        </p:nvSpPr>
+        <p:spPr/>
+        <p:txBody>
+          <a:bodyPr/>
+          <a:lstStyle/>
+          <a:p>
+            <a:fld id="{F7021451-1387-4CA6-816F-3879F97B5CBC}" type="slidenum">
+              <a:rPr lang="en-US"/>
+              <a:t>2</a:t>
+            </a:fld>
+            <a:endParaRPr lang="en-US"/>
+          </a:p>
+        </p:txBody>
+      </p:sp>
+    </p:spTree>
+    <p:extLst>
+      <p:ext uri="{BB962C8B-B14F-4D97-AF65-F5344CB8AC3E}">
+        <p14:creationId xmlns:p14="http://schemas.microsoft.com/office/powerpoint/2010/main" val="1024086991"/>
+      </p:ext>
+    </p:extLst>
+  </p:cSld>
+  <p:clrMapOvr>
+    <a:masterClrMapping/>
+  </p:clrMapOvr>
+</p:notes>
+</file>
+
 <file path=ppt/slideLayouts/slideLayout1.xml><?xml version="1.0" encoding="utf-8"?>
 <p:sldLayout xmlns:a="http://schemas.openxmlformats.org/drawingml/2006/main" xmlns:r="http://schemas.openxmlformats.org/officeDocument/2006/relationships" xmlns:p="http://schemas.openxmlformats.org/presentationml/2006/main" type="title" preserve="1">
   <p:cSld name="Title Slide">
@@ -259,7 +700,7 @@
           <a:p>
             <a:fld id="{F3BCDD3C-0A14-5443-8EFA-3755733257C1}" type="datetimeFigureOut">
               <a:rPr lang="en-US" smtClean="0"/>
-              <a:t>2/6/26</a:t>
+              <a:t>2/16/26</a:t>
             </a:fld>
             <a:endParaRPr lang="en-US"/>
           </a:p>
@@ -457,7 +898,7 @@
           <a:p>
             <a:fld id="{F3BCDD3C-0A14-5443-8EFA-3755733257C1}" type="datetimeFigureOut">
               <a:rPr lang="en-US" smtClean="0"/>
-              <a:t>2/6/26</a:t>
+              <a:t>2/16/26</a:t>
             </a:fld>
             <a:endParaRPr lang="en-US"/>
           </a:p>
@@ -665,7 +1106,7 @@
           <a:p>
             <a:fld id="{F3BCDD3C-0A14-5443-8EFA-3755733257C1}" type="datetimeFigureOut">
               <a:rPr lang="en-US" smtClean="0"/>
-              <a:t>2/6/26</a:t>
+              <a:t>2/16/26</a:t>
             </a:fld>
             <a:endParaRPr lang="en-US"/>
           </a:p>
@@ -729,6 +1170,41 @@
     <p:extLst>
       <p:ext uri="{BB962C8B-B14F-4D97-AF65-F5344CB8AC3E}">
         <p14:creationId xmlns:p14="http://schemas.microsoft.com/office/powerpoint/2010/main" val="541871500"/>
+      </p:ext>
+    </p:extLst>
+  </p:cSld>
+  <p:clrMapOvr>
+    <a:masterClrMapping/>
+  </p:clrMapOvr>
+</p:sldLayout>
+</file>
+
+<file path=ppt/slideLayouts/slideLayout12.xml><?xml version="1.0" encoding="utf-8"?>
+<p:sldLayout xmlns:a="http://schemas.openxmlformats.org/drawingml/2006/main" xmlns:r="http://schemas.openxmlformats.org/officeDocument/2006/relationships" xmlns:p="http://schemas.openxmlformats.org/presentationml/2006/main">
+  <p:cSld name="DEFAULT">
+    <p:bg>
+      <p:bgRef idx="1001">
+        <a:schemeClr val="bg1"/>
+      </p:bgRef>
+    </p:bg>
+    <p:spTree>
+      <p:nvGrpSpPr>
+        <p:cNvPr id="1" name=""/>
+        <p:cNvGrpSpPr/>
+        <p:nvPr/>
+      </p:nvGrpSpPr>
+      <p:grpSpPr>
+        <a:xfrm>
+          <a:off x="0" y="0"/>
+          <a:ext cx="0" cy="0"/>
+          <a:chOff x="0" y="0"/>
+          <a:chExt cx="0" cy="0"/>
+        </a:xfrm>
+      </p:grpSpPr>
+    </p:spTree>
+    <p:extLst>
+      <p:ext uri="{BB962C8B-B14F-4D97-AF65-F5344CB8AC3E}">
+        <p14:creationId xmlns:p14="http://schemas.microsoft.com/office/powerpoint/2010/main" val="397695837"/>
       </p:ext>
     </p:extLst>
   </p:cSld>
@@ -863,7 +1339,7 @@
           <a:p>
             <a:fld id="{F3BCDD3C-0A14-5443-8EFA-3755733257C1}" type="datetimeFigureOut">
               <a:rPr lang="en-US" smtClean="0"/>
-              <a:t>2/6/26</a:t>
+              <a:t>2/16/26</a:t>
             </a:fld>
             <a:endParaRPr lang="en-US"/>
           </a:p>
@@ -1138,7 +1614,7 @@
           <a:p>
             <a:fld id="{F3BCDD3C-0A14-5443-8EFA-3755733257C1}" type="datetimeFigureOut">
               <a:rPr lang="en-US" smtClean="0"/>
-              <a:t>2/6/26</a:t>
+              <a:t>2/16/26</a:t>
             </a:fld>
             <a:endParaRPr lang="en-US"/>
           </a:p>
@@ -1403,7 +1879,7 @@
           <a:p>
             <a:fld id="{F3BCDD3C-0A14-5443-8EFA-3755733257C1}" type="datetimeFigureOut">
               <a:rPr lang="en-US" smtClean="0"/>
-              <a:t>2/6/26</a:t>
+              <a:t>2/16/26</a:t>
             </a:fld>
             <a:endParaRPr lang="en-US"/>
           </a:p>
@@ -1815,7 +2291,7 @@
           <a:p>
             <a:fld id="{F3BCDD3C-0A14-5443-8EFA-3755733257C1}" type="datetimeFigureOut">
               <a:rPr lang="en-US" smtClean="0"/>
-              <a:t>2/6/26</a:t>
+              <a:t>2/16/26</a:t>
             </a:fld>
             <a:endParaRPr lang="en-US"/>
           </a:p>
@@ -1956,7 +2432,7 @@
           <a:p>
             <a:fld id="{F3BCDD3C-0A14-5443-8EFA-3755733257C1}" type="datetimeFigureOut">
               <a:rPr lang="en-US" smtClean="0"/>
-              <a:t>2/6/26</a:t>
+              <a:t>2/16/26</a:t>
             </a:fld>
             <a:endParaRPr lang="en-US"/>
           </a:p>
@@ -2069,7 +2545,7 @@
           <a:p>
             <a:fld id="{F3BCDD3C-0A14-5443-8EFA-3755733257C1}" type="datetimeFigureOut">
               <a:rPr lang="en-US" smtClean="0"/>
-              <a:t>2/6/26</a:t>
+              <a:t>2/16/26</a:t>
             </a:fld>
             <a:endParaRPr lang="en-US"/>
           </a:p>
@@ -2380,7 +2856,7 @@
           <a:p>
             <a:fld id="{F3BCDD3C-0A14-5443-8EFA-3755733257C1}" type="datetimeFigureOut">
               <a:rPr lang="en-US" smtClean="0"/>
-              <a:t>2/6/26</a:t>
+              <a:t>2/16/26</a:t>
             </a:fld>
             <a:endParaRPr lang="en-US"/>
           </a:p>
@@ -2668,7 +3144,7 @@
           <a:p>
             <a:fld id="{F3BCDD3C-0A14-5443-8EFA-3755733257C1}" type="datetimeFigureOut">
               <a:rPr lang="en-US" smtClean="0"/>
-              <a:t>2/6/26</a:t>
+              <a:t>2/16/26</a:t>
             </a:fld>
             <a:endParaRPr lang="en-US"/>
           </a:p>
@@ -2909,7 +3385,7 @@
           <a:p>
             <a:fld id="{F3BCDD3C-0A14-5443-8EFA-3755733257C1}" type="datetimeFigureOut">
               <a:rPr lang="en-US" smtClean="0"/>
-              <a:t>2/6/26</a:t>
+              <a:t>2/16/26</a:t>
             </a:fld>
             <a:endParaRPr lang="en-US"/>
           </a:p>
@@ -3025,6 +3501,7 @@
     <p:sldLayoutId id="2147483657" r:id="rId9"/>
     <p:sldLayoutId id="2147483658" r:id="rId10"/>
     <p:sldLayoutId id="2147483659" r:id="rId11"/>
+    <p:sldLayoutId id="2147483660" r:id="rId12"/>
   </p:sldLayoutIdLst>
   <p:txStyles>
     <p:titleStyle>
@@ -8184,6 +8661,4040 @@
 </p:sld>
 </file>
 
+<file path=ppt/slides/slide2.xml><?xml version="1.0" encoding="utf-8"?>
+<p:sld xmlns:a="http://schemas.openxmlformats.org/drawingml/2006/main" xmlns:r="http://schemas.openxmlformats.org/officeDocument/2006/relationships" xmlns:p="http://schemas.openxmlformats.org/presentationml/2006/main">
+  <p:cSld>
+    <p:spTree>
+      <p:nvGrpSpPr>
+        <p:cNvPr id="1" name=""/>
+        <p:cNvGrpSpPr/>
+        <p:nvPr/>
+      </p:nvGrpSpPr>
+      <p:grpSpPr>
+        <a:xfrm>
+          <a:off x="0" y="0"/>
+          <a:ext cx="0" cy="0"/>
+          <a:chOff x="0" y="0"/>
+          <a:chExt cx="0" cy="0"/>
+        </a:xfrm>
+      </p:grpSpPr>
+      <p:sp>
+        <p:nvSpPr>
+          <p:cNvPr id="104" name="Shape 23">
+            <a:extLst>
+              <a:ext uri="{FF2B5EF4-FFF2-40B4-BE49-F238E27FC236}">
+                <a16:creationId xmlns:a16="http://schemas.microsoft.com/office/drawing/2014/main" id="{E6B7759A-9384-25CC-5164-60A73DB64D1C}"/>
+              </a:ext>
+            </a:extLst>
+          </p:cNvPr>
+          <p:cNvSpPr/>
+          <p:nvPr/>
+        </p:nvSpPr>
+        <p:spPr>
+          <a:xfrm>
+            <a:off x="3785615" y="4634601"/>
+            <a:ext cx="5381208" cy="1380743"/>
+          </a:xfrm>
+          <a:prstGeom prst="roundRect">
+            <a:avLst/>
+          </a:prstGeom>
+          <a:solidFill>
+            <a:schemeClr val="bg1">
+              <a:lumMod val="95000"/>
+            </a:schemeClr>
+          </a:solidFill>
+          <a:ln w="12700">
+            <a:solidFill>
+              <a:srgbClr val="CBD5E1"/>
+            </a:solidFill>
+            <a:prstDash val="solid"/>
+          </a:ln>
+          <a:effectLst>
+            <a:outerShdw blurRad="38100" dist="15240" dir="2700000" algn="bl" rotWithShape="0">
+              <a:srgbClr val="000000">
+                <a:alpha val="14000"/>
+              </a:srgbClr>
+            </a:outerShdw>
+          </a:effectLst>
+        </p:spPr>
+        <p:txBody>
+          <a:bodyPr/>
+          <a:lstStyle/>
+          <a:p>
+            <a:endParaRPr lang="en-US" dirty="0"/>
+          </a:p>
+        </p:txBody>
+      </p:sp>
+      <p:sp>
+        <p:nvSpPr>
+          <p:cNvPr id="109" name="Shape 23">
+            <a:extLst>
+              <a:ext uri="{FF2B5EF4-FFF2-40B4-BE49-F238E27FC236}">
+                <a16:creationId xmlns:a16="http://schemas.microsoft.com/office/drawing/2014/main" id="{CB4C57D0-426E-7A7D-C4C3-03D8015C3D2A}"/>
+              </a:ext>
+            </a:extLst>
+          </p:cNvPr>
+          <p:cNvSpPr/>
+          <p:nvPr/>
+        </p:nvSpPr>
+        <p:spPr>
+          <a:xfrm>
+            <a:off x="3883672" y="4793566"/>
+            <a:ext cx="5381208" cy="1380743"/>
+          </a:xfrm>
+          <a:prstGeom prst="roundRect">
+            <a:avLst/>
+          </a:prstGeom>
+          <a:solidFill>
+            <a:schemeClr val="bg1">
+              <a:lumMod val="95000"/>
+            </a:schemeClr>
+          </a:solidFill>
+          <a:ln w="12700">
+            <a:solidFill>
+              <a:srgbClr val="CBD5E1"/>
+            </a:solidFill>
+            <a:prstDash val="solid"/>
+          </a:ln>
+          <a:effectLst>
+            <a:outerShdw blurRad="38100" dist="15240" dir="2700000" algn="bl" rotWithShape="0">
+              <a:srgbClr val="000000">
+                <a:alpha val="14000"/>
+              </a:srgbClr>
+            </a:outerShdw>
+          </a:effectLst>
+        </p:spPr>
+        <p:txBody>
+          <a:bodyPr/>
+          <a:lstStyle/>
+          <a:p>
+            <a:endParaRPr lang="en-US" dirty="0"/>
+          </a:p>
+        </p:txBody>
+      </p:sp>
+      <p:sp>
+        <p:nvSpPr>
+          <p:cNvPr id="3" name="Text 1"/>
+          <p:cNvSpPr/>
+          <p:nvPr/>
+        </p:nvSpPr>
+        <p:spPr>
+          <a:xfrm>
+            <a:off x="548640" y="320040"/>
+            <a:ext cx="11155680" cy="457200"/>
+          </a:xfrm>
+          <a:prstGeom prst="rect">
+            <a:avLst/>
+          </a:prstGeom>
+          <a:noFill/>
+          <a:ln/>
+        </p:spPr>
+        <p:txBody>
+          <a:bodyPr wrap="square" rtlCol="0" anchor="ctr"/>
+          <a:lstStyle/>
+          <a:p>
+            <a:pPr marL="0" indent="0" algn="ctr">
+              <a:buNone/>
+            </a:pPr>
+            <a:r>
+              <a:rPr lang="en-US" sz="3000" b="1" dirty="0">
+                <a:solidFill>
+                  <a:srgbClr val="111827"/>
+                </a:solidFill>
+                <a:latin typeface="Calibri" pitchFamily="34" charset="0"/>
+                <a:ea typeface="Calibri" pitchFamily="34" charset="-122"/>
+                <a:cs typeface="Calibri" pitchFamily="34" charset="-120"/>
+              </a:rPr>
+              <a:t>Agentic Coworker Platform Architecture</a:t>
+            </a:r>
+            <a:endParaRPr lang="en-US" sz="3000" dirty="0"/>
+          </a:p>
+        </p:txBody>
+      </p:sp>
+      <p:sp>
+        <p:nvSpPr>
+          <p:cNvPr id="4" name="Shape 2"/>
+          <p:cNvSpPr/>
+          <p:nvPr/>
+        </p:nvSpPr>
+        <p:spPr>
+          <a:xfrm>
+            <a:off x="502920" y="1325880"/>
+            <a:ext cx="2331720" cy="5074920"/>
+          </a:xfrm>
+          <a:prstGeom prst="roundRect">
+            <a:avLst/>
+          </a:prstGeom>
+          <a:solidFill>
+            <a:srgbClr val="FFFFFF"/>
+          </a:solidFill>
+          <a:ln w="12700">
+            <a:solidFill>
+              <a:srgbClr val="CBD5E1"/>
+            </a:solidFill>
+            <a:prstDash val="solid"/>
+          </a:ln>
+          <a:effectLst>
+            <a:outerShdw blurRad="38100" dist="15240" dir="2700000" algn="bl" rotWithShape="0">
+              <a:srgbClr val="000000">
+                <a:alpha val="14000"/>
+              </a:srgbClr>
+            </a:outerShdw>
+          </a:effectLst>
+        </p:spPr>
+        <p:txBody>
+          <a:bodyPr/>
+          <a:lstStyle/>
+          <a:p>
+            <a:endParaRPr lang="en-US"/>
+          </a:p>
+        </p:txBody>
+      </p:sp>
+      <p:sp>
+        <p:nvSpPr>
+          <p:cNvPr id="5" name="Shape 3"/>
+          <p:cNvSpPr/>
+          <p:nvPr/>
+        </p:nvSpPr>
+        <p:spPr>
+          <a:xfrm>
+            <a:off x="640080" y="1463040"/>
+            <a:ext cx="2057400" cy="566928"/>
+          </a:xfrm>
+          <a:prstGeom prst="roundRect">
+            <a:avLst/>
+          </a:prstGeom>
+          <a:solidFill>
+            <a:srgbClr val="EFF6FF"/>
+          </a:solidFill>
+          <a:ln w="12700">
+            <a:solidFill>
+              <a:srgbClr val="FFFFFF">
+                <a:alpha val="0"/>
+              </a:srgbClr>
+            </a:solidFill>
+            <a:prstDash val="solid"/>
+          </a:ln>
+        </p:spPr>
+        <p:txBody>
+          <a:bodyPr/>
+          <a:lstStyle/>
+          <a:p>
+            <a:endParaRPr lang="en-US"/>
+          </a:p>
+        </p:txBody>
+      </p:sp>
+      <p:pic>
+        <p:nvPicPr>
+          <p:cNvPr id="6" name="Image 0" descr="/mnt/data/agentic_icons/stack.png"/>
+          <p:cNvPicPr>
+            <a:picLocks noChangeAspect="1"/>
+          </p:cNvPicPr>
+          <p:nvPr/>
+        </p:nvPicPr>
+        <p:blipFill>
+          <a:blip r:embed="rId3"/>
+          <a:stretch>
+            <a:fillRect/>
+          </a:stretch>
+        </p:blipFill>
+        <p:spPr>
+          <a:xfrm>
+            <a:off x="749808" y="1572768"/>
+            <a:ext cx="329184" cy="329184"/>
+          </a:xfrm>
+          <a:prstGeom prst="rect">
+            <a:avLst/>
+          </a:prstGeom>
+        </p:spPr>
+      </p:pic>
+      <p:sp>
+        <p:nvSpPr>
+          <p:cNvPr id="7" name="Text 4"/>
+          <p:cNvSpPr/>
+          <p:nvPr/>
+        </p:nvSpPr>
+        <p:spPr>
+          <a:xfrm>
+            <a:off x="1161288" y="1554480"/>
+            <a:ext cx="1508760" cy="365760"/>
+          </a:xfrm>
+          <a:prstGeom prst="rect">
+            <a:avLst/>
+          </a:prstGeom>
+          <a:noFill/>
+          <a:ln/>
+        </p:spPr>
+        <p:txBody>
+          <a:bodyPr wrap="square" rtlCol="0" anchor="ctr"/>
+          <a:lstStyle/>
+          <a:p>
+            <a:pPr marL="0" indent="0">
+              <a:buNone/>
+            </a:pPr>
+            <a:r>
+              <a:rPr lang="en-US" sz="1600" b="1" dirty="0">
+                <a:solidFill>
+                  <a:srgbClr val="111827"/>
+                </a:solidFill>
+                <a:latin typeface="Calibri" pitchFamily="34" charset="0"/>
+                <a:ea typeface="Calibri" pitchFamily="34" charset="-122"/>
+                <a:cs typeface="Calibri" pitchFamily="34" charset="-120"/>
+              </a:rPr>
+              <a:t>Agent Frameworks</a:t>
+            </a:r>
+            <a:endParaRPr lang="en-US" sz="1600" dirty="0"/>
+          </a:p>
+        </p:txBody>
+      </p:sp>
+      <p:sp>
+        <p:nvSpPr>
+          <p:cNvPr id="8" name="Shape 5"/>
+          <p:cNvSpPr/>
+          <p:nvPr/>
+        </p:nvSpPr>
+        <p:spPr>
+          <a:xfrm>
+            <a:off x="685800" y="2194560"/>
+            <a:ext cx="1965960" cy="502920"/>
+          </a:xfrm>
+          <a:prstGeom prst="roundRect">
+            <a:avLst/>
+          </a:prstGeom>
+          <a:solidFill>
+            <a:srgbClr val="FFFFFF"/>
+          </a:solidFill>
+          <a:ln w="12700">
+            <a:solidFill>
+              <a:srgbClr val="CBD5E1"/>
+            </a:solidFill>
+            <a:prstDash val="solid"/>
+          </a:ln>
+        </p:spPr>
+        <p:txBody>
+          <a:bodyPr/>
+          <a:lstStyle/>
+          <a:p>
+            <a:endParaRPr lang="en-US"/>
+          </a:p>
+        </p:txBody>
+      </p:sp>
+      <p:sp>
+        <p:nvSpPr>
+          <p:cNvPr id="9" name="Shape 6"/>
+          <p:cNvSpPr/>
+          <p:nvPr/>
+        </p:nvSpPr>
+        <p:spPr>
+          <a:xfrm>
+            <a:off x="813816" y="2359152"/>
+            <a:ext cx="164592" cy="164592"/>
+          </a:xfrm>
+          <a:prstGeom prst="ellipse">
+            <a:avLst/>
+          </a:prstGeom>
+          <a:solidFill>
+            <a:srgbClr val="0EA5E9"/>
+          </a:solidFill>
+          <a:ln w="12700">
+            <a:solidFill>
+              <a:srgbClr val="FFFFFF">
+                <a:alpha val="0"/>
+              </a:srgbClr>
+            </a:solidFill>
+            <a:prstDash val="solid"/>
+          </a:ln>
+        </p:spPr>
+        <p:txBody>
+          <a:bodyPr/>
+          <a:lstStyle/>
+          <a:p>
+            <a:endParaRPr lang="en-US"/>
+          </a:p>
+        </p:txBody>
+      </p:sp>
+      <p:sp>
+        <p:nvSpPr>
+          <p:cNvPr id="10" name="Text 7"/>
+          <p:cNvSpPr/>
+          <p:nvPr/>
+        </p:nvSpPr>
+        <p:spPr>
+          <a:xfrm>
+            <a:off x="1051560" y="2322576"/>
+            <a:ext cx="1600200" cy="274320"/>
+          </a:xfrm>
+          <a:prstGeom prst="rect">
+            <a:avLst/>
+          </a:prstGeom>
+          <a:noFill/>
+          <a:ln/>
+        </p:spPr>
+        <p:txBody>
+          <a:bodyPr wrap="square" rtlCol="0" anchor="ctr"/>
+          <a:lstStyle/>
+          <a:p>
+            <a:pPr marL="0" indent="0">
+              <a:buNone/>
+            </a:pPr>
+            <a:r>
+              <a:rPr lang="en-US" sz="1300" dirty="0">
+                <a:solidFill>
+                  <a:srgbClr val="374151"/>
+                </a:solidFill>
+                <a:latin typeface="Calibri" pitchFamily="34" charset="0"/>
+                <a:ea typeface="Calibri" pitchFamily="34" charset="-122"/>
+                <a:cs typeface="Calibri" pitchFamily="34" charset="-120"/>
+              </a:rPr>
+              <a:t>Google ADK</a:t>
+            </a:r>
+            <a:endParaRPr lang="en-US" sz="1300" dirty="0"/>
+          </a:p>
+        </p:txBody>
+      </p:sp>
+      <p:sp>
+        <p:nvSpPr>
+          <p:cNvPr id="11" name="Shape 8"/>
+          <p:cNvSpPr/>
+          <p:nvPr/>
+        </p:nvSpPr>
+        <p:spPr>
+          <a:xfrm>
+            <a:off x="685800" y="2816352"/>
+            <a:ext cx="1965960" cy="502920"/>
+          </a:xfrm>
+          <a:prstGeom prst="roundRect">
+            <a:avLst/>
+          </a:prstGeom>
+          <a:solidFill>
+            <a:srgbClr val="FFFFFF"/>
+          </a:solidFill>
+          <a:ln w="12700">
+            <a:solidFill>
+              <a:srgbClr val="CBD5E1"/>
+            </a:solidFill>
+            <a:prstDash val="solid"/>
+          </a:ln>
+        </p:spPr>
+        <p:txBody>
+          <a:bodyPr/>
+          <a:lstStyle/>
+          <a:p>
+            <a:endParaRPr lang="en-US"/>
+          </a:p>
+        </p:txBody>
+      </p:sp>
+      <p:sp>
+        <p:nvSpPr>
+          <p:cNvPr id="12" name="Shape 9"/>
+          <p:cNvSpPr/>
+          <p:nvPr/>
+        </p:nvSpPr>
+        <p:spPr>
+          <a:xfrm>
+            <a:off x="813816" y="2980944"/>
+            <a:ext cx="164592" cy="164592"/>
+          </a:xfrm>
+          <a:prstGeom prst="ellipse">
+            <a:avLst/>
+          </a:prstGeom>
+          <a:solidFill>
+            <a:srgbClr val="0EA5E9"/>
+          </a:solidFill>
+          <a:ln w="12700">
+            <a:solidFill>
+              <a:srgbClr val="FFFFFF">
+                <a:alpha val="0"/>
+              </a:srgbClr>
+            </a:solidFill>
+            <a:prstDash val="solid"/>
+          </a:ln>
+        </p:spPr>
+        <p:txBody>
+          <a:bodyPr/>
+          <a:lstStyle/>
+          <a:p>
+            <a:endParaRPr lang="en-US"/>
+          </a:p>
+        </p:txBody>
+      </p:sp>
+      <p:sp>
+        <p:nvSpPr>
+          <p:cNvPr id="13" name="Text 10"/>
+          <p:cNvSpPr/>
+          <p:nvPr/>
+        </p:nvSpPr>
+        <p:spPr>
+          <a:xfrm>
+            <a:off x="1051560" y="2944368"/>
+            <a:ext cx="1600200" cy="274320"/>
+          </a:xfrm>
+          <a:prstGeom prst="rect">
+            <a:avLst/>
+          </a:prstGeom>
+          <a:noFill/>
+          <a:ln/>
+        </p:spPr>
+        <p:txBody>
+          <a:bodyPr wrap="square" rtlCol="0" anchor="ctr"/>
+          <a:lstStyle/>
+          <a:p>
+            <a:pPr marL="0" indent="0">
+              <a:buNone/>
+            </a:pPr>
+            <a:r>
+              <a:rPr lang="en-US" sz="1300" dirty="0">
+                <a:solidFill>
+                  <a:srgbClr val="374151"/>
+                </a:solidFill>
+                <a:latin typeface="Calibri" pitchFamily="34" charset="0"/>
+                <a:ea typeface="Calibri" pitchFamily="34" charset="-122"/>
+                <a:cs typeface="Calibri" pitchFamily="34" charset="-120"/>
+              </a:rPr>
+              <a:t>LangGraph</a:t>
+            </a:r>
+            <a:endParaRPr lang="en-US" sz="1300" dirty="0"/>
+          </a:p>
+        </p:txBody>
+      </p:sp>
+      <p:sp>
+        <p:nvSpPr>
+          <p:cNvPr id="14" name="Shape 11"/>
+          <p:cNvSpPr/>
+          <p:nvPr/>
+        </p:nvSpPr>
+        <p:spPr>
+          <a:xfrm>
+            <a:off x="685800" y="3438144"/>
+            <a:ext cx="1965960" cy="502920"/>
+          </a:xfrm>
+          <a:prstGeom prst="roundRect">
+            <a:avLst/>
+          </a:prstGeom>
+          <a:solidFill>
+            <a:srgbClr val="FFFFFF"/>
+          </a:solidFill>
+          <a:ln w="12700">
+            <a:solidFill>
+              <a:srgbClr val="CBD5E1"/>
+            </a:solidFill>
+            <a:prstDash val="solid"/>
+          </a:ln>
+        </p:spPr>
+        <p:txBody>
+          <a:bodyPr/>
+          <a:lstStyle/>
+          <a:p>
+            <a:endParaRPr lang="en-US"/>
+          </a:p>
+        </p:txBody>
+      </p:sp>
+      <p:sp>
+        <p:nvSpPr>
+          <p:cNvPr id="15" name="Shape 12"/>
+          <p:cNvSpPr/>
+          <p:nvPr/>
+        </p:nvSpPr>
+        <p:spPr>
+          <a:xfrm>
+            <a:off x="813816" y="3602736"/>
+            <a:ext cx="164592" cy="164592"/>
+          </a:xfrm>
+          <a:prstGeom prst="ellipse">
+            <a:avLst/>
+          </a:prstGeom>
+          <a:solidFill>
+            <a:srgbClr val="0EA5E9"/>
+          </a:solidFill>
+          <a:ln w="12700">
+            <a:solidFill>
+              <a:srgbClr val="FFFFFF">
+                <a:alpha val="0"/>
+              </a:srgbClr>
+            </a:solidFill>
+            <a:prstDash val="solid"/>
+          </a:ln>
+        </p:spPr>
+        <p:txBody>
+          <a:bodyPr/>
+          <a:lstStyle/>
+          <a:p>
+            <a:endParaRPr lang="en-US"/>
+          </a:p>
+        </p:txBody>
+      </p:sp>
+      <p:sp>
+        <p:nvSpPr>
+          <p:cNvPr id="16" name="Text 13"/>
+          <p:cNvSpPr/>
+          <p:nvPr/>
+        </p:nvSpPr>
+        <p:spPr>
+          <a:xfrm>
+            <a:off x="1051560" y="3566160"/>
+            <a:ext cx="1600200" cy="274320"/>
+          </a:xfrm>
+          <a:prstGeom prst="rect">
+            <a:avLst/>
+          </a:prstGeom>
+          <a:noFill/>
+          <a:ln/>
+        </p:spPr>
+        <p:txBody>
+          <a:bodyPr wrap="square" rtlCol="0" anchor="ctr"/>
+          <a:lstStyle/>
+          <a:p>
+            <a:pPr marL="0" indent="0">
+              <a:buNone/>
+            </a:pPr>
+            <a:r>
+              <a:rPr lang="en-US" sz="1300" dirty="0">
+                <a:solidFill>
+                  <a:srgbClr val="374151"/>
+                </a:solidFill>
+                <a:latin typeface="Calibri" pitchFamily="34" charset="0"/>
+                <a:ea typeface="Calibri" pitchFamily="34" charset="-122"/>
+                <a:cs typeface="Calibri" pitchFamily="34" charset="-120"/>
+              </a:rPr>
+              <a:t>AWS AgentCore</a:t>
+            </a:r>
+            <a:endParaRPr lang="en-US" sz="1300" dirty="0"/>
+          </a:p>
+        </p:txBody>
+      </p:sp>
+      <p:sp>
+        <p:nvSpPr>
+          <p:cNvPr id="17" name="Shape 14"/>
+          <p:cNvSpPr/>
+          <p:nvPr/>
+        </p:nvSpPr>
+        <p:spPr>
+          <a:xfrm>
+            <a:off x="685800" y="4059936"/>
+            <a:ext cx="1965960" cy="502920"/>
+          </a:xfrm>
+          <a:prstGeom prst="roundRect">
+            <a:avLst/>
+          </a:prstGeom>
+          <a:solidFill>
+            <a:srgbClr val="FFFFFF"/>
+          </a:solidFill>
+          <a:ln w="12700">
+            <a:solidFill>
+              <a:srgbClr val="CBD5E1"/>
+            </a:solidFill>
+            <a:prstDash val="solid"/>
+          </a:ln>
+        </p:spPr>
+        <p:txBody>
+          <a:bodyPr/>
+          <a:lstStyle/>
+          <a:p>
+            <a:endParaRPr lang="en-US"/>
+          </a:p>
+        </p:txBody>
+      </p:sp>
+      <p:sp>
+        <p:nvSpPr>
+          <p:cNvPr id="18" name="Shape 15"/>
+          <p:cNvSpPr/>
+          <p:nvPr/>
+        </p:nvSpPr>
+        <p:spPr>
+          <a:xfrm>
+            <a:off x="813816" y="4224528"/>
+            <a:ext cx="164592" cy="164592"/>
+          </a:xfrm>
+          <a:prstGeom prst="ellipse">
+            <a:avLst/>
+          </a:prstGeom>
+          <a:solidFill>
+            <a:srgbClr val="0EA5E9"/>
+          </a:solidFill>
+          <a:ln w="12700">
+            <a:solidFill>
+              <a:srgbClr val="FFFFFF">
+                <a:alpha val="0"/>
+              </a:srgbClr>
+            </a:solidFill>
+            <a:prstDash val="solid"/>
+          </a:ln>
+        </p:spPr>
+        <p:txBody>
+          <a:bodyPr/>
+          <a:lstStyle/>
+          <a:p>
+            <a:endParaRPr lang="en-US"/>
+          </a:p>
+        </p:txBody>
+      </p:sp>
+      <p:sp>
+        <p:nvSpPr>
+          <p:cNvPr id="19" name="Text 16"/>
+          <p:cNvSpPr/>
+          <p:nvPr/>
+        </p:nvSpPr>
+        <p:spPr>
+          <a:xfrm>
+            <a:off x="1051560" y="4187952"/>
+            <a:ext cx="1600200" cy="274320"/>
+          </a:xfrm>
+          <a:prstGeom prst="rect">
+            <a:avLst/>
+          </a:prstGeom>
+          <a:noFill/>
+          <a:ln/>
+        </p:spPr>
+        <p:txBody>
+          <a:bodyPr wrap="square" rtlCol="0" anchor="ctr"/>
+          <a:lstStyle/>
+          <a:p>
+            <a:pPr marL="0" indent="0">
+              <a:buNone/>
+            </a:pPr>
+            <a:r>
+              <a:rPr lang="en-US" sz="1300" dirty="0">
+                <a:solidFill>
+                  <a:srgbClr val="374151"/>
+                </a:solidFill>
+                <a:latin typeface="Calibri" pitchFamily="34" charset="0"/>
+                <a:ea typeface="Calibri" pitchFamily="34" charset="-122"/>
+                <a:cs typeface="Calibri" pitchFamily="34" charset="-120"/>
+              </a:rPr>
+              <a:t>Semantic Kernel</a:t>
+            </a:r>
+            <a:endParaRPr lang="en-US" sz="1300" dirty="0"/>
+          </a:p>
+        </p:txBody>
+      </p:sp>
+      <p:sp>
+        <p:nvSpPr>
+          <p:cNvPr id="20" name="Shape 17"/>
+          <p:cNvSpPr/>
+          <p:nvPr/>
+        </p:nvSpPr>
+        <p:spPr>
+          <a:xfrm>
+            <a:off x="685800" y="4681728"/>
+            <a:ext cx="1965960" cy="502920"/>
+          </a:xfrm>
+          <a:prstGeom prst="roundRect">
+            <a:avLst/>
+          </a:prstGeom>
+          <a:solidFill>
+            <a:srgbClr val="FFFFFF"/>
+          </a:solidFill>
+          <a:ln w="12700">
+            <a:solidFill>
+              <a:srgbClr val="CBD5E1"/>
+            </a:solidFill>
+            <a:prstDash val="solid"/>
+          </a:ln>
+        </p:spPr>
+        <p:txBody>
+          <a:bodyPr/>
+          <a:lstStyle/>
+          <a:p>
+            <a:endParaRPr lang="en-US"/>
+          </a:p>
+        </p:txBody>
+      </p:sp>
+      <p:sp>
+        <p:nvSpPr>
+          <p:cNvPr id="21" name="Shape 18"/>
+          <p:cNvSpPr/>
+          <p:nvPr/>
+        </p:nvSpPr>
+        <p:spPr>
+          <a:xfrm>
+            <a:off x="813816" y="4846320"/>
+            <a:ext cx="164592" cy="164592"/>
+          </a:xfrm>
+          <a:prstGeom prst="ellipse">
+            <a:avLst/>
+          </a:prstGeom>
+          <a:solidFill>
+            <a:srgbClr val="0EA5E9"/>
+          </a:solidFill>
+          <a:ln w="12700">
+            <a:solidFill>
+              <a:srgbClr val="FFFFFF">
+                <a:alpha val="0"/>
+              </a:srgbClr>
+            </a:solidFill>
+            <a:prstDash val="solid"/>
+          </a:ln>
+        </p:spPr>
+        <p:txBody>
+          <a:bodyPr/>
+          <a:lstStyle/>
+          <a:p>
+            <a:endParaRPr lang="en-US"/>
+          </a:p>
+        </p:txBody>
+      </p:sp>
+      <p:sp>
+        <p:nvSpPr>
+          <p:cNvPr id="22" name="Text 19"/>
+          <p:cNvSpPr/>
+          <p:nvPr/>
+        </p:nvSpPr>
+        <p:spPr>
+          <a:xfrm>
+            <a:off x="1051560" y="4809744"/>
+            <a:ext cx="1600200" cy="274320"/>
+          </a:xfrm>
+          <a:prstGeom prst="rect">
+            <a:avLst/>
+          </a:prstGeom>
+          <a:noFill/>
+          <a:ln/>
+        </p:spPr>
+        <p:txBody>
+          <a:bodyPr wrap="square" rtlCol="0" anchor="ctr"/>
+          <a:lstStyle/>
+          <a:p>
+            <a:pPr marL="0" indent="0">
+              <a:buNone/>
+            </a:pPr>
+            <a:r>
+              <a:rPr lang="en-US" sz="1300" dirty="0">
+                <a:solidFill>
+                  <a:srgbClr val="374151"/>
+                </a:solidFill>
+                <a:latin typeface="Calibri" pitchFamily="34" charset="0"/>
+                <a:ea typeface="Calibri" pitchFamily="34" charset="-122"/>
+                <a:cs typeface="Calibri" pitchFamily="34" charset="-120"/>
+              </a:rPr>
+              <a:t>Claude Agent SDK</a:t>
+            </a:r>
+            <a:endParaRPr lang="en-US" sz="1300" dirty="0"/>
+          </a:p>
+        </p:txBody>
+      </p:sp>
+      <p:sp>
+        <p:nvSpPr>
+          <p:cNvPr id="23" name="Shape 20"/>
+          <p:cNvSpPr/>
+          <p:nvPr/>
+        </p:nvSpPr>
+        <p:spPr>
+          <a:xfrm>
+            <a:off x="685800" y="5303520"/>
+            <a:ext cx="1965960" cy="502920"/>
+          </a:xfrm>
+          <a:prstGeom prst="roundRect">
+            <a:avLst/>
+          </a:prstGeom>
+          <a:solidFill>
+            <a:srgbClr val="FFFFFF"/>
+          </a:solidFill>
+          <a:ln w="12700">
+            <a:solidFill>
+              <a:srgbClr val="CBD5E1"/>
+            </a:solidFill>
+            <a:prstDash val="solid"/>
+          </a:ln>
+        </p:spPr>
+        <p:txBody>
+          <a:bodyPr/>
+          <a:lstStyle/>
+          <a:p>
+            <a:endParaRPr lang="en-US"/>
+          </a:p>
+        </p:txBody>
+      </p:sp>
+      <p:sp>
+        <p:nvSpPr>
+          <p:cNvPr id="24" name="Shape 21"/>
+          <p:cNvSpPr/>
+          <p:nvPr/>
+        </p:nvSpPr>
+        <p:spPr>
+          <a:xfrm>
+            <a:off x="813816" y="5468112"/>
+            <a:ext cx="164592" cy="164592"/>
+          </a:xfrm>
+          <a:prstGeom prst="ellipse">
+            <a:avLst/>
+          </a:prstGeom>
+          <a:solidFill>
+            <a:srgbClr val="0EA5E9"/>
+          </a:solidFill>
+          <a:ln w="12700">
+            <a:solidFill>
+              <a:srgbClr val="FFFFFF">
+                <a:alpha val="0"/>
+              </a:srgbClr>
+            </a:solidFill>
+            <a:prstDash val="solid"/>
+          </a:ln>
+        </p:spPr>
+        <p:txBody>
+          <a:bodyPr/>
+          <a:lstStyle/>
+          <a:p>
+            <a:endParaRPr lang="en-US"/>
+          </a:p>
+        </p:txBody>
+      </p:sp>
+      <p:sp>
+        <p:nvSpPr>
+          <p:cNvPr id="25" name="Text 22"/>
+          <p:cNvSpPr/>
+          <p:nvPr/>
+        </p:nvSpPr>
+        <p:spPr>
+          <a:xfrm>
+            <a:off x="1051560" y="5431536"/>
+            <a:ext cx="1600200" cy="274320"/>
+          </a:xfrm>
+          <a:prstGeom prst="rect">
+            <a:avLst/>
+          </a:prstGeom>
+          <a:noFill/>
+          <a:ln/>
+        </p:spPr>
+        <p:txBody>
+          <a:bodyPr wrap="square" rtlCol="0" anchor="ctr"/>
+          <a:lstStyle/>
+          <a:p>
+            <a:pPr marL="0" indent="0">
+              <a:buNone/>
+            </a:pPr>
+            <a:r>
+              <a:rPr lang="en-US" sz="1300" dirty="0">
+                <a:solidFill>
+                  <a:srgbClr val="374151"/>
+                </a:solidFill>
+                <a:latin typeface="Calibri" pitchFamily="34" charset="0"/>
+                <a:ea typeface="Calibri" pitchFamily="34" charset="-122"/>
+                <a:cs typeface="Calibri" pitchFamily="34" charset="-120"/>
+              </a:rPr>
+              <a:t>OpenAI Agent SDK</a:t>
+            </a:r>
+            <a:endParaRPr lang="en-US" sz="1300" dirty="0"/>
+          </a:p>
+        </p:txBody>
+      </p:sp>
+      <p:sp>
+        <p:nvSpPr>
+          <p:cNvPr id="26" name="Shape 23"/>
+          <p:cNvSpPr/>
+          <p:nvPr/>
+        </p:nvSpPr>
+        <p:spPr>
+          <a:xfrm>
+            <a:off x="3273552" y="1143000"/>
+            <a:ext cx="6390212" cy="1417320"/>
+          </a:xfrm>
+          <a:prstGeom prst="roundRect">
+            <a:avLst/>
+          </a:prstGeom>
+          <a:solidFill>
+            <a:srgbClr val="FFFFFF"/>
+          </a:solidFill>
+          <a:ln w="12700">
+            <a:solidFill>
+              <a:srgbClr val="CBD5E1"/>
+            </a:solidFill>
+            <a:prstDash val="solid"/>
+          </a:ln>
+          <a:effectLst>
+            <a:outerShdw blurRad="38100" dist="15240" dir="2700000" algn="bl" rotWithShape="0">
+              <a:srgbClr val="000000">
+                <a:alpha val="14000"/>
+              </a:srgbClr>
+            </a:outerShdw>
+          </a:effectLst>
+        </p:spPr>
+        <p:txBody>
+          <a:bodyPr/>
+          <a:lstStyle/>
+          <a:p>
+            <a:endParaRPr lang="en-US"/>
+          </a:p>
+        </p:txBody>
+      </p:sp>
+      <p:sp>
+        <p:nvSpPr>
+          <p:cNvPr id="27" name="Shape 24"/>
+          <p:cNvSpPr/>
+          <p:nvPr/>
+        </p:nvSpPr>
+        <p:spPr>
+          <a:xfrm>
+            <a:off x="3520440" y="1280160"/>
+            <a:ext cx="5943600" cy="566928"/>
+          </a:xfrm>
+          <a:prstGeom prst="roundRect">
+            <a:avLst/>
+          </a:prstGeom>
+          <a:solidFill>
+            <a:srgbClr val="EFF6FF"/>
+          </a:solidFill>
+          <a:ln w="12700">
+            <a:solidFill>
+              <a:srgbClr val="FFFFFF">
+                <a:alpha val="0"/>
+              </a:srgbClr>
+            </a:solidFill>
+            <a:prstDash val="solid"/>
+          </a:ln>
+        </p:spPr>
+        <p:txBody>
+          <a:bodyPr/>
+          <a:lstStyle/>
+          <a:p>
+            <a:endParaRPr lang="en-US"/>
+          </a:p>
+        </p:txBody>
+      </p:sp>
+      <p:pic>
+        <p:nvPicPr>
+          <p:cNvPr id="28" name="Image 1" descr="/mnt/data/agentic_icons/gear.png"/>
+          <p:cNvPicPr>
+            <a:picLocks noChangeAspect="1"/>
+          </p:cNvPicPr>
+          <p:nvPr/>
+        </p:nvPicPr>
+        <p:blipFill>
+          <a:blip r:embed="rId4"/>
+          <a:stretch>
+            <a:fillRect/>
+          </a:stretch>
+        </p:blipFill>
+        <p:spPr>
+          <a:xfrm>
+            <a:off x="3630168" y="1389888"/>
+            <a:ext cx="329184" cy="329184"/>
+          </a:xfrm>
+          <a:prstGeom prst="rect">
+            <a:avLst/>
+          </a:prstGeom>
+        </p:spPr>
+      </p:pic>
+      <p:sp>
+        <p:nvSpPr>
+          <p:cNvPr id="29" name="Text 25"/>
+          <p:cNvSpPr/>
+          <p:nvPr/>
+        </p:nvSpPr>
+        <p:spPr>
+          <a:xfrm>
+            <a:off x="4041648" y="1371600"/>
+            <a:ext cx="5394960" cy="365760"/>
+          </a:xfrm>
+          <a:prstGeom prst="rect">
+            <a:avLst/>
+          </a:prstGeom>
+          <a:noFill/>
+          <a:ln/>
+        </p:spPr>
+        <p:txBody>
+          <a:bodyPr wrap="square" rtlCol="0" anchor="ctr"/>
+          <a:lstStyle/>
+          <a:p>
+            <a:pPr marL="0" indent="0">
+              <a:buNone/>
+            </a:pPr>
+            <a:r>
+              <a:rPr lang="en-US" sz="1600" b="1" dirty="0">
+                <a:solidFill>
+                  <a:srgbClr val="111827"/>
+                </a:solidFill>
+                <a:latin typeface="Calibri" pitchFamily="34" charset="0"/>
+                <a:ea typeface="Calibri" pitchFamily="34" charset="-122"/>
+                <a:cs typeface="Calibri" pitchFamily="34" charset="-120"/>
+              </a:rPr>
+              <a:t>Agent Studio</a:t>
+            </a:r>
+            <a:endParaRPr lang="en-US" sz="1600" dirty="0"/>
+          </a:p>
+        </p:txBody>
+      </p:sp>
+      <p:sp>
+        <p:nvSpPr>
+          <p:cNvPr id="30" name="Shape 26"/>
+          <p:cNvSpPr/>
+          <p:nvPr/>
+        </p:nvSpPr>
+        <p:spPr>
+          <a:xfrm>
+            <a:off x="3438143" y="1939972"/>
+            <a:ext cx="1938528" cy="530352"/>
+          </a:xfrm>
+          <a:prstGeom prst="roundRect">
+            <a:avLst/>
+          </a:prstGeom>
+          <a:solidFill>
+            <a:srgbClr val="FFFFFF"/>
+          </a:solidFill>
+          <a:ln w="12700">
+            <a:solidFill>
+              <a:srgbClr val="CBD5E1"/>
+            </a:solidFill>
+            <a:prstDash val="solid"/>
+          </a:ln>
+          <a:effectLst>
+            <a:outerShdw blurRad="38100" dist="19050" dir="2700000" algn="bl" rotWithShape="0">
+              <a:srgbClr val="000000">
+                <a:alpha val="18000"/>
+              </a:srgbClr>
+            </a:outerShdw>
+          </a:effectLst>
+        </p:spPr>
+        <p:txBody>
+          <a:bodyPr/>
+          <a:lstStyle/>
+          <a:p>
+            <a:endParaRPr lang="en-US"/>
+          </a:p>
+        </p:txBody>
+      </p:sp>
+      <p:sp>
+        <p:nvSpPr>
+          <p:cNvPr id="31" name="Shape 27"/>
+          <p:cNvSpPr/>
+          <p:nvPr/>
+        </p:nvSpPr>
+        <p:spPr>
+          <a:xfrm>
+            <a:off x="3502151" y="2086276"/>
+            <a:ext cx="384048" cy="329184"/>
+          </a:xfrm>
+          <a:prstGeom prst="roundRect">
+            <a:avLst/>
+          </a:prstGeom>
+          <a:solidFill>
+            <a:srgbClr val="EFF6FF"/>
+          </a:solidFill>
+          <a:ln w="12700">
+            <a:solidFill>
+              <a:srgbClr val="FFFFFF">
+                <a:alpha val="0"/>
+              </a:srgbClr>
+            </a:solidFill>
+            <a:prstDash val="solid"/>
+          </a:ln>
+        </p:spPr>
+        <p:txBody>
+          <a:bodyPr/>
+          <a:lstStyle/>
+          <a:p>
+            <a:endParaRPr lang="en-US"/>
+          </a:p>
+        </p:txBody>
+      </p:sp>
+      <p:pic>
+        <p:nvPicPr>
+          <p:cNvPr id="32" name="Image 2" descr="/mnt/data/agentic_icons/gear.png"/>
+          <p:cNvPicPr>
+            <a:picLocks noChangeAspect="1"/>
+          </p:cNvPicPr>
+          <p:nvPr/>
+        </p:nvPicPr>
+        <p:blipFill>
+          <a:blip r:embed="rId4"/>
+          <a:stretch>
+            <a:fillRect/>
+          </a:stretch>
+        </p:blipFill>
+        <p:spPr>
+          <a:xfrm>
+            <a:off x="3566159" y="2109136"/>
+            <a:ext cx="256032" cy="256032"/>
+          </a:xfrm>
+          <a:prstGeom prst="rect">
+            <a:avLst/>
+          </a:prstGeom>
+        </p:spPr>
+      </p:pic>
+      <p:sp>
+        <p:nvSpPr>
+          <p:cNvPr id="33" name="Text 28"/>
+          <p:cNvSpPr/>
+          <p:nvPr/>
+        </p:nvSpPr>
+        <p:spPr>
+          <a:xfrm>
+            <a:off x="3849623" y="2049700"/>
+            <a:ext cx="1400555" cy="274320"/>
+          </a:xfrm>
+          <a:prstGeom prst="rect">
+            <a:avLst/>
+          </a:prstGeom>
+          <a:noFill/>
+          <a:ln/>
+        </p:spPr>
+        <p:txBody>
+          <a:bodyPr wrap="square" rtlCol="0" anchor="ctr"/>
+          <a:lstStyle/>
+          <a:p>
+            <a:pPr marL="0" indent="0">
+              <a:buNone/>
+            </a:pPr>
+            <a:r>
+              <a:rPr lang="en-US" sz="1500" b="1" dirty="0">
+                <a:solidFill>
+                  <a:srgbClr val="111827"/>
+                </a:solidFill>
+                <a:latin typeface="Calibri" pitchFamily="34" charset="0"/>
+                <a:ea typeface="Calibri" pitchFamily="34" charset="-122"/>
+                <a:cs typeface="Calibri" pitchFamily="34" charset="-120"/>
+              </a:rPr>
+              <a:t>Agent Factory</a:t>
+            </a:r>
+            <a:endParaRPr lang="en-US" sz="1500" dirty="0"/>
+          </a:p>
+        </p:txBody>
+      </p:sp>
+      <p:sp>
+        <p:nvSpPr>
+          <p:cNvPr id="34" name="Text 29"/>
+          <p:cNvSpPr/>
+          <p:nvPr/>
+        </p:nvSpPr>
+        <p:spPr>
+          <a:xfrm>
+            <a:off x="3921253" y="2313173"/>
+            <a:ext cx="1691640" cy="91440"/>
+          </a:xfrm>
+          <a:prstGeom prst="rect">
+            <a:avLst/>
+          </a:prstGeom>
+          <a:noFill/>
+          <a:ln/>
+        </p:spPr>
+        <p:txBody>
+          <a:bodyPr wrap="square" rtlCol="0" anchor="ctr"/>
+          <a:lstStyle/>
+          <a:p>
+            <a:pPr marL="0" indent="0">
+              <a:buNone/>
+            </a:pPr>
+            <a:r>
+              <a:rPr lang="en-US" sz="1100" dirty="0">
+                <a:solidFill>
+                  <a:srgbClr val="6B7280"/>
+                </a:solidFill>
+                <a:latin typeface="Calibri" pitchFamily="34" charset="0"/>
+                <a:ea typeface="Calibri" pitchFamily="34" charset="-122"/>
+                <a:cs typeface="Calibri" pitchFamily="34" charset="-120"/>
+              </a:rPr>
+              <a:t>Build &amp; configure agents</a:t>
+            </a:r>
+            <a:endParaRPr lang="en-US" sz="1100" dirty="0"/>
+          </a:p>
+        </p:txBody>
+      </p:sp>
+      <p:sp>
+        <p:nvSpPr>
+          <p:cNvPr id="35" name="Shape 30"/>
+          <p:cNvSpPr/>
+          <p:nvPr/>
+        </p:nvSpPr>
+        <p:spPr>
+          <a:xfrm>
+            <a:off x="7470648" y="1920240"/>
+            <a:ext cx="1984248" cy="530352"/>
+          </a:xfrm>
+          <a:prstGeom prst="roundRect">
+            <a:avLst/>
+          </a:prstGeom>
+          <a:solidFill>
+            <a:srgbClr val="FFFFFF"/>
+          </a:solidFill>
+          <a:ln w="12700">
+            <a:solidFill>
+              <a:srgbClr val="CBD5E1"/>
+            </a:solidFill>
+            <a:prstDash val="solid"/>
+          </a:ln>
+          <a:effectLst>
+            <a:outerShdw blurRad="38100" dist="19050" dir="2700000" algn="bl" rotWithShape="0">
+              <a:srgbClr val="000000">
+                <a:alpha val="18000"/>
+              </a:srgbClr>
+            </a:outerShdw>
+          </a:effectLst>
+        </p:spPr>
+        <p:txBody>
+          <a:bodyPr/>
+          <a:lstStyle/>
+          <a:p>
+            <a:endParaRPr lang="en-US" dirty="0"/>
+          </a:p>
+        </p:txBody>
+      </p:sp>
+      <p:sp>
+        <p:nvSpPr>
+          <p:cNvPr id="36" name="Shape 31"/>
+          <p:cNvSpPr/>
+          <p:nvPr/>
+        </p:nvSpPr>
+        <p:spPr>
+          <a:xfrm>
+            <a:off x="7498080" y="2084832"/>
+            <a:ext cx="347472" cy="329184"/>
+          </a:xfrm>
+          <a:prstGeom prst="roundRect">
+            <a:avLst/>
+          </a:prstGeom>
+          <a:solidFill>
+            <a:srgbClr val="EFF6FF"/>
+          </a:solidFill>
+          <a:ln w="12700">
+            <a:solidFill>
+              <a:srgbClr val="FFFFFF">
+                <a:alpha val="0"/>
+              </a:srgbClr>
+            </a:solidFill>
+            <a:prstDash val="solid"/>
+          </a:ln>
+        </p:spPr>
+        <p:txBody>
+          <a:bodyPr/>
+          <a:lstStyle/>
+          <a:p>
+            <a:endParaRPr lang="en-US"/>
+          </a:p>
+        </p:txBody>
+      </p:sp>
+      <p:pic>
+        <p:nvPicPr>
+          <p:cNvPr id="37" name="Image 3" descr="/mnt/data/agentic_icons/plug.png"/>
+          <p:cNvPicPr>
+            <a:picLocks noChangeAspect="1"/>
+          </p:cNvPicPr>
+          <p:nvPr/>
+        </p:nvPicPr>
+        <p:blipFill>
+          <a:blip r:embed="rId5"/>
+          <a:stretch>
+            <a:fillRect/>
+          </a:stretch>
+        </p:blipFill>
+        <p:spPr>
+          <a:xfrm>
+            <a:off x="7543800" y="2103120"/>
+            <a:ext cx="256032" cy="256032"/>
+          </a:xfrm>
+          <a:prstGeom prst="rect">
+            <a:avLst/>
+          </a:prstGeom>
+        </p:spPr>
+      </p:pic>
+      <p:sp>
+        <p:nvSpPr>
+          <p:cNvPr id="38" name="Text 32"/>
+          <p:cNvSpPr/>
+          <p:nvPr/>
+        </p:nvSpPr>
+        <p:spPr>
+          <a:xfrm>
+            <a:off x="7790688" y="2039112"/>
+            <a:ext cx="1691640" cy="274320"/>
+          </a:xfrm>
+          <a:prstGeom prst="rect">
+            <a:avLst/>
+          </a:prstGeom>
+          <a:noFill/>
+          <a:ln/>
+        </p:spPr>
+        <p:txBody>
+          <a:bodyPr wrap="square" rtlCol="0" anchor="ctr"/>
+          <a:lstStyle/>
+          <a:p>
+            <a:pPr marL="0" indent="0">
+              <a:buNone/>
+            </a:pPr>
+            <a:r>
+              <a:rPr lang="en-US" sz="1500" b="1" dirty="0">
+                <a:solidFill>
+                  <a:srgbClr val="111827"/>
+                </a:solidFill>
+                <a:latin typeface="Calibri" pitchFamily="34" charset="0"/>
+                <a:ea typeface="Calibri" pitchFamily="34" charset="-122"/>
+                <a:cs typeface="Calibri" pitchFamily="34" charset="-120"/>
+              </a:rPr>
+              <a:t>Agent Skill Builder</a:t>
+            </a:r>
+            <a:endParaRPr lang="en-US" sz="1500" dirty="0"/>
+          </a:p>
+        </p:txBody>
+      </p:sp>
+      <p:sp>
+        <p:nvSpPr>
+          <p:cNvPr id="39" name="Text 33"/>
+          <p:cNvSpPr/>
+          <p:nvPr/>
+        </p:nvSpPr>
+        <p:spPr>
+          <a:xfrm>
+            <a:off x="7827264" y="2295144"/>
+            <a:ext cx="1691640" cy="91440"/>
+          </a:xfrm>
+          <a:prstGeom prst="rect">
+            <a:avLst/>
+          </a:prstGeom>
+          <a:noFill/>
+          <a:ln/>
+        </p:spPr>
+        <p:txBody>
+          <a:bodyPr wrap="square" rtlCol="0" anchor="ctr"/>
+          <a:lstStyle/>
+          <a:p>
+            <a:pPr marL="0" indent="0">
+              <a:buNone/>
+            </a:pPr>
+            <a:r>
+              <a:rPr lang="en-US" sz="1100" dirty="0">
+                <a:solidFill>
+                  <a:srgbClr val="6B7280"/>
+                </a:solidFill>
+                <a:latin typeface="Calibri" pitchFamily="34" charset="0"/>
+                <a:ea typeface="Calibri" pitchFamily="34" charset="-122"/>
+                <a:cs typeface="Calibri" pitchFamily="34" charset="-120"/>
+              </a:rPr>
+              <a:t>Learn tools &amp; skills</a:t>
+            </a:r>
+            <a:endParaRPr lang="en-US" sz="1100" dirty="0"/>
+          </a:p>
+        </p:txBody>
+      </p:sp>
+      <p:sp>
+        <p:nvSpPr>
+          <p:cNvPr id="40" name="Shape 34"/>
+          <p:cNvSpPr/>
+          <p:nvPr/>
+        </p:nvSpPr>
+        <p:spPr>
+          <a:xfrm>
+            <a:off x="3419855" y="3059723"/>
+            <a:ext cx="964692" cy="841248"/>
+          </a:xfrm>
+          <a:prstGeom prst="roundRect">
+            <a:avLst/>
+          </a:prstGeom>
+          <a:solidFill>
+            <a:srgbClr val="FFFFFF"/>
+          </a:solidFill>
+          <a:ln w="12700">
+            <a:solidFill>
+              <a:srgbClr val="CBD5E1"/>
+            </a:solidFill>
+            <a:prstDash val="solid"/>
+          </a:ln>
+          <a:effectLst>
+            <a:outerShdw blurRad="38100" dist="16510" dir="2700000" algn="bl" rotWithShape="0">
+              <a:srgbClr val="000000">
+                <a:alpha val="16000"/>
+              </a:srgbClr>
+            </a:outerShdw>
+          </a:effectLst>
+        </p:spPr>
+        <p:txBody>
+          <a:bodyPr/>
+          <a:lstStyle/>
+          <a:p>
+            <a:endParaRPr lang="en-US"/>
+          </a:p>
+        </p:txBody>
+      </p:sp>
+      <p:sp>
+        <p:nvSpPr>
+          <p:cNvPr id="41" name="Shape 35"/>
+          <p:cNvSpPr/>
+          <p:nvPr/>
+        </p:nvSpPr>
+        <p:spPr>
+          <a:xfrm>
+            <a:off x="3653027" y="3196883"/>
+            <a:ext cx="502920" cy="402336"/>
+          </a:xfrm>
+          <a:prstGeom prst="roundRect">
+            <a:avLst/>
+          </a:prstGeom>
+          <a:solidFill>
+            <a:srgbClr val="EFF6FF"/>
+          </a:solidFill>
+          <a:ln w="12700">
+            <a:solidFill>
+              <a:srgbClr val="FFFFFF">
+                <a:alpha val="0"/>
+              </a:srgbClr>
+            </a:solidFill>
+            <a:prstDash val="solid"/>
+          </a:ln>
+        </p:spPr>
+        <p:txBody>
+          <a:bodyPr/>
+          <a:lstStyle/>
+          <a:p>
+            <a:endParaRPr lang="en-US"/>
+          </a:p>
+        </p:txBody>
+      </p:sp>
+      <p:pic>
+        <p:nvPicPr>
+          <p:cNvPr id="42" name="Image 4" descr="/mnt/data/agentic_icons/key.png"/>
+          <p:cNvPicPr>
+            <a:picLocks noChangeAspect="1"/>
+          </p:cNvPicPr>
+          <p:nvPr/>
+        </p:nvPicPr>
+        <p:blipFill>
+          <a:blip r:embed="rId6"/>
+          <a:stretch>
+            <a:fillRect/>
+          </a:stretch>
+        </p:blipFill>
+        <p:spPr>
+          <a:xfrm>
+            <a:off x="3785615" y="3288323"/>
+            <a:ext cx="237744" cy="237744"/>
+          </a:xfrm>
+          <a:prstGeom prst="rect">
+            <a:avLst/>
+          </a:prstGeom>
+        </p:spPr>
+      </p:pic>
+      <p:sp>
+        <p:nvSpPr>
+          <p:cNvPr id="43" name="Text 36"/>
+          <p:cNvSpPr/>
+          <p:nvPr/>
+        </p:nvSpPr>
+        <p:spPr>
+          <a:xfrm>
+            <a:off x="3282695" y="3599219"/>
+            <a:ext cx="1243584" cy="146304"/>
+          </a:xfrm>
+          <a:prstGeom prst="rect">
+            <a:avLst/>
+          </a:prstGeom>
+          <a:noFill/>
+          <a:ln/>
+        </p:spPr>
+        <p:txBody>
+          <a:bodyPr wrap="square" rtlCol="0" anchor="ctr"/>
+          <a:lstStyle/>
+          <a:p>
+            <a:pPr marL="0" indent="0" algn="ctr">
+              <a:buNone/>
+            </a:pPr>
+            <a:r>
+              <a:rPr lang="en-US" sz="1300" b="1" dirty="0">
+                <a:solidFill>
+                  <a:srgbClr val="111827"/>
+                </a:solidFill>
+                <a:latin typeface="Calibri" pitchFamily="34" charset="0"/>
+                <a:ea typeface="Calibri" pitchFamily="34" charset="-122"/>
+                <a:cs typeface="Calibri" pitchFamily="34" charset="-120"/>
+              </a:rPr>
+              <a:t>OAuth 2.0</a:t>
+            </a:r>
+            <a:endParaRPr lang="en-US" sz="1300" dirty="0"/>
+          </a:p>
+        </p:txBody>
+      </p:sp>
+      <p:sp>
+        <p:nvSpPr>
+          <p:cNvPr id="44" name="Text 37"/>
+          <p:cNvSpPr/>
+          <p:nvPr/>
+        </p:nvSpPr>
+        <p:spPr>
+          <a:xfrm>
+            <a:off x="3282695" y="3727235"/>
+            <a:ext cx="1243584" cy="146304"/>
+          </a:xfrm>
+          <a:prstGeom prst="rect">
+            <a:avLst/>
+          </a:prstGeom>
+          <a:noFill/>
+          <a:ln/>
+        </p:spPr>
+        <p:txBody>
+          <a:bodyPr wrap="square" rtlCol="0" anchor="t">
+            <a:noAutofit/>
+          </a:bodyPr>
+          <a:lstStyle/>
+          <a:p>
+            <a:pPr marL="0" indent="0" algn="ctr">
+              <a:buNone/>
+            </a:pPr>
+            <a:r>
+              <a:rPr lang="en-US" sz="800" dirty="0">
+                <a:solidFill>
+                  <a:srgbClr val="6B7280"/>
+                </a:solidFill>
+                <a:latin typeface="Calibri" pitchFamily="34" charset="0"/>
+                <a:ea typeface="Calibri" pitchFamily="34" charset="-122"/>
+                <a:cs typeface="Calibri" pitchFamily="34" charset="-120"/>
+              </a:rPr>
+              <a:t>(Keycloak)</a:t>
+            </a:r>
+            <a:endParaRPr lang="en-US" sz="800" dirty="0"/>
+          </a:p>
+        </p:txBody>
+      </p:sp>
+      <p:sp>
+        <p:nvSpPr>
+          <p:cNvPr id="45" name="Shape 38"/>
+          <p:cNvSpPr/>
+          <p:nvPr/>
+        </p:nvSpPr>
+        <p:spPr>
+          <a:xfrm>
+            <a:off x="4709160" y="3063240"/>
+            <a:ext cx="1463040" cy="841248"/>
+          </a:xfrm>
+          <a:prstGeom prst="roundRect">
+            <a:avLst/>
+          </a:prstGeom>
+          <a:solidFill>
+            <a:srgbClr val="FFFFFF"/>
+          </a:solidFill>
+          <a:ln w="12700">
+            <a:solidFill>
+              <a:srgbClr val="CBD5E1"/>
+            </a:solidFill>
+            <a:prstDash val="solid"/>
+          </a:ln>
+          <a:effectLst>
+            <a:outerShdw blurRad="38100" dist="16510" dir="2700000" algn="bl" rotWithShape="0">
+              <a:srgbClr val="000000">
+                <a:alpha val="16000"/>
+              </a:srgbClr>
+            </a:outerShdw>
+          </a:effectLst>
+        </p:spPr>
+        <p:txBody>
+          <a:bodyPr/>
+          <a:lstStyle/>
+          <a:p>
+            <a:endParaRPr lang="en-US"/>
+          </a:p>
+        </p:txBody>
+      </p:sp>
+      <p:sp>
+        <p:nvSpPr>
+          <p:cNvPr id="46" name="Shape 39"/>
+          <p:cNvSpPr/>
+          <p:nvPr/>
+        </p:nvSpPr>
+        <p:spPr>
+          <a:xfrm>
+            <a:off x="5189220" y="3209544"/>
+            <a:ext cx="502920" cy="402336"/>
+          </a:xfrm>
+          <a:prstGeom prst="roundRect">
+            <a:avLst/>
+          </a:prstGeom>
+          <a:solidFill>
+            <a:srgbClr val="EFF6FF"/>
+          </a:solidFill>
+          <a:ln w="12700">
+            <a:solidFill>
+              <a:srgbClr val="FFFFFF">
+                <a:alpha val="0"/>
+              </a:srgbClr>
+            </a:solidFill>
+            <a:prstDash val="solid"/>
+          </a:ln>
+        </p:spPr>
+        <p:txBody>
+          <a:bodyPr/>
+          <a:lstStyle/>
+          <a:p>
+            <a:endParaRPr lang="en-US"/>
+          </a:p>
+        </p:txBody>
+      </p:sp>
+      <p:pic>
+        <p:nvPicPr>
+          <p:cNvPr id="47" name="Image 5" descr="/mnt/data/agentic_icons/plug.png"/>
+          <p:cNvPicPr>
+            <a:picLocks noChangeAspect="1"/>
+          </p:cNvPicPr>
+          <p:nvPr/>
+        </p:nvPicPr>
+        <p:blipFill>
+          <a:blip r:embed="rId5"/>
+          <a:stretch>
+            <a:fillRect/>
+          </a:stretch>
+        </p:blipFill>
+        <p:spPr>
+          <a:xfrm>
+            <a:off x="5321808" y="3300984"/>
+            <a:ext cx="237744" cy="237744"/>
+          </a:xfrm>
+          <a:prstGeom prst="rect">
+            <a:avLst/>
+          </a:prstGeom>
+        </p:spPr>
+      </p:pic>
+      <p:sp>
+        <p:nvSpPr>
+          <p:cNvPr id="48" name="Text 40"/>
+          <p:cNvSpPr/>
+          <p:nvPr/>
+        </p:nvSpPr>
+        <p:spPr>
+          <a:xfrm>
+            <a:off x="4818888" y="3611880"/>
+            <a:ext cx="1243584" cy="146304"/>
+          </a:xfrm>
+          <a:prstGeom prst="rect">
+            <a:avLst/>
+          </a:prstGeom>
+          <a:noFill/>
+          <a:ln/>
+        </p:spPr>
+        <p:txBody>
+          <a:bodyPr wrap="square" rtlCol="0" anchor="ctr"/>
+          <a:lstStyle/>
+          <a:p>
+            <a:pPr marL="0" indent="0" algn="ctr">
+              <a:buNone/>
+            </a:pPr>
+            <a:r>
+              <a:rPr lang="en-US" sz="1300" b="1" dirty="0">
+                <a:solidFill>
+                  <a:srgbClr val="111827"/>
+                </a:solidFill>
+                <a:latin typeface="Calibri" pitchFamily="34" charset="0"/>
+                <a:ea typeface="Calibri" pitchFamily="34" charset="-122"/>
+                <a:cs typeface="Calibri" pitchFamily="34" charset="-120"/>
+              </a:rPr>
+              <a:t>MCP Services</a:t>
+            </a:r>
+            <a:endParaRPr lang="en-US" sz="1300" dirty="0"/>
+          </a:p>
+        </p:txBody>
+      </p:sp>
+      <p:sp>
+        <p:nvSpPr>
+          <p:cNvPr id="49" name="Shape 41"/>
+          <p:cNvSpPr/>
+          <p:nvPr/>
+        </p:nvSpPr>
+        <p:spPr>
+          <a:xfrm>
+            <a:off x="6400800" y="3063240"/>
+            <a:ext cx="1463040" cy="841248"/>
+          </a:xfrm>
+          <a:prstGeom prst="roundRect">
+            <a:avLst/>
+          </a:prstGeom>
+          <a:solidFill>
+            <a:srgbClr val="FFFFFF"/>
+          </a:solidFill>
+          <a:ln w="12700">
+            <a:solidFill>
+              <a:srgbClr val="CBD5E1"/>
+            </a:solidFill>
+            <a:prstDash val="solid"/>
+          </a:ln>
+          <a:effectLst>
+            <a:outerShdw blurRad="38100" dist="16510" dir="2700000" algn="bl" rotWithShape="0">
+              <a:srgbClr val="000000">
+                <a:alpha val="16000"/>
+              </a:srgbClr>
+            </a:outerShdw>
+          </a:effectLst>
+        </p:spPr>
+        <p:txBody>
+          <a:bodyPr/>
+          <a:lstStyle/>
+          <a:p>
+            <a:endParaRPr lang="en-US"/>
+          </a:p>
+        </p:txBody>
+      </p:sp>
+      <p:sp>
+        <p:nvSpPr>
+          <p:cNvPr id="50" name="Shape 42"/>
+          <p:cNvSpPr/>
+          <p:nvPr/>
+        </p:nvSpPr>
+        <p:spPr>
+          <a:xfrm>
+            <a:off x="6880860" y="3209544"/>
+            <a:ext cx="502920" cy="402336"/>
+          </a:xfrm>
+          <a:prstGeom prst="roundRect">
+            <a:avLst/>
+          </a:prstGeom>
+          <a:solidFill>
+            <a:srgbClr val="EFF6FF"/>
+          </a:solidFill>
+          <a:ln w="12700">
+            <a:solidFill>
+              <a:srgbClr val="FFFFFF">
+                <a:alpha val="0"/>
+              </a:srgbClr>
+            </a:solidFill>
+            <a:prstDash val="solid"/>
+          </a:ln>
+        </p:spPr>
+        <p:txBody>
+          <a:bodyPr/>
+          <a:lstStyle/>
+          <a:p>
+            <a:endParaRPr lang="en-US"/>
+          </a:p>
+        </p:txBody>
+      </p:sp>
+      <p:pic>
+        <p:nvPicPr>
+          <p:cNvPr id="51" name="Image 6" descr="/mnt/data/agentic_icons/gear.png"/>
+          <p:cNvPicPr>
+            <a:picLocks noChangeAspect="1"/>
+          </p:cNvPicPr>
+          <p:nvPr/>
+        </p:nvPicPr>
+        <p:blipFill>
+          <a:blip r:embed="rId4"/>
+          <a:stretch>
+            <a:fillRect/>
+          </a:stretch>
+        </p:blipFill>
+        <p:spPr>
+          <a:xfrm>
+            <a:off x="7013448" y="3300984"/>
+            <a:ext cx="237744" cy="237744"/>
+          </a:xfrm>
+          <a:prstGeom prst="rect">
+            <a:avLst/>
+          </a:prstGeom>
+        </p:spPr>
+      </p:pic>
+      <p:sp>
+        <p:nvSpPr>
+          <p:cNvPr id="52" name="Text 43"/>
+          <p:cNvSpPr/>
+          <p:nvPr/>
+        </p:nvSpPr>
+        <p:spPr>
+          <a:xfrm>
+            <a:off x="6510528" y="3611880"/>
+            <a:ext cx="1243584" cy="146304"/>
+          </a:xfrm>
+          <a:prstGeom prst="rect">
+            <a:avLst/>
+          </a:prstGeom>
+          <a:noFill/>
+          <a:ln/>
+        </p:spPr>
+        <p:txBody>
+          <a:bodyPr wrap="square" rtlCol="0" anchor="ctr"/>
+          <a:lstStyle/>
+          <a:p>
+            <a:pPr marL="0" indent="0" algn="ctr">
+              <a:buNone/>
+            </a:pPr>
+            <a:r>
+              <a:rPr lang="en-US" sz="1300" b="1" dirty="0">
+                <a:solidFill>
+                  <a:srgbClr val="111827"/>
+                </a:solidFill>
+                <a:latin typeface="Calibri" pitchFamily="34" charset="0"/>
+                <a:ea typeface="Calibri" pitchFamily="34" charset="-122"/>
+                <a:cs typeface="Calibri" pitchFamily="34" charset="-120"/>
+              </a:rPr>
+              <a:t>Integrator</a:t>
+            </a:r>
+            <a:endParaRPr lang="en-US" sz="1300" dirty="0"/>
+          </a:p>
+        </p:txBody>
+      </p:sp>
+      <p:sp>
+        <p:nvSpPr>
+          <p:cNvPr id="53" name="Shape 44"/>
+          <p:cNvSpPr/>
+          <p:nvPr/>
+        </p:nvSpPr>
+        <p:spPr>
+          <a:xfrm>
+            <a:off x="8092440" y="3063240"/>
+            <a:ext cx="1463040" cy="841248"/>
+          </a:xfrm>
+          <a:prstGeom prst="roundRect">
+            <a:avLst/>
+          </a:prstGeom>
+          <a:solidFill>
+            <a:srgbClr val="FFFFFF"/>
+          </a:solidFill>
+          <a:ln w="12700">
+            <a:solidFill>
+              <a:srgbClr val="CBD5E1"/>
+            </a:solidFill>
+            <a:prstDash val="solid"/>
+          </a:ln>
+          <a:effectLst>
+            <a:outerShdw blurRad="38100" dist="16510" dir="2700000" algn="bl" rotWithShape="0">
+              <a:srgbClr val="000000">
+                <a:alpha val="16000"/>
+              </a:srgbClr>
+            </a:outerShdw>
+          </a:effectLst>
+        </p:spPr>
+        <p:txBody>
+          <a:bodyPr/>
+          <a:lstStyle/>
+          <a:p>
+            <a:endParaRPr lang="en-US"/>
+          </a:p>
+        </p:txBody>
+      </p:sp>
+      <p:sp>
+        <p:nvSpPr>
+          <p:cNvPr id="54" name="Shape 45"/>
+          <p:cNvSpPr/>
+          <p:nvPr/>
+        </p:nvSpPr>
+        <p:spPr>
+          <a:xfrm>
+            <a:off x="8572500" y="3209544"/>
+            <a:ext cx="502920" cy="402336"/>
+          </a:xfrm>
+          <a:prstGeom prst="roundRect">
+            <a:avLst/>
+          </a:prstGeom>
+          <a:solidFill>
+            <a:srgbClr val="EFF6FF"/>
+          </a:solidFill>
+          <a:ln w="12700">
+            <a:solidFill>
+              <a:srgbClr val="FFFFFF">
+                <a:alpha val="0"/>
+              </a:srgbClr>
+            </a:solidFill>
+            <a:prstDash val="solid"/>
+          </a:ln>
+        </p:spPr>
+        <p:txBody>
+          <a:bodyPr/>
+          <a:lstStyle/>
+          <a:p>
+            <a:endParaRPr lang="en-US"/>
+          </a:p>
+        </p:txBody>
+      </p:sp>
+      <p:pic>
+        <p:nvPicPr>
+          <p:cNvPr id="55" name="Image 7" descr="/mnt/data/agentic_icons/gateway.png"/>
+          <p:cNvPicPr>
+            <a:picLocks noChangeAspect="1"/>
+          </p:cNvPicPr>
+          <p:nvPr/>
+        </p:nvPicPr>
+        <p:blipFill>
+          <a:blip r:embed="rId7"/>
+          <a:stretch>
+            <a:fillRect/>
+          </a:stretch>
+        </p:blipFill>
+        <p:spPr>
+          <a:xfrm>
+            <a:off x="8705088" y="3300984"/>
+            <a:ext cx="237744" cy="237744"/>
+          </a:xfrm>
+          <a:prstGeom prst="rect">
+            <a:avLst/>
+          </a:prstGeom>
+        </p:spPr>
+      </p:pic>
+      <p:sp>
+        <p:nvSpPr>
+          <p:cNvPr id="56" name="Text 46"/>
+          <p:cNvSpPr/>
+          <p:nvPr/>
+        </p:nvSpPr>
+        <p:spPr>
+          <a:xfrm>
+            <a:off x="8202168" y="3611880"/>
+            <a:ext cx="1243584" cy="146304"/>
+          </a:xfrm>
+          <a:prstGeom prst="rect">
+            <a:avLst/>
+          </a:prstGeom>
+          <a:noFill/>
+          <a:ln/>
+        </p:spPr>
+        <p:txBody>
+          <a:bodyPr wrap="square" rtlCol="0" anchor="ctr"/>
+          <a:lstStyle/>
+          <a:p>
+            <a:pPr marL="0" indent="0" algn="ctr">
+              <a:buNone/>
+            </a:pPr>
+            <a:r>
+              <a:rPr lang="en-US" sz="1300" b="1" dirty="0">
+                <a:solidFill>
+                  <a:srgbClr val="111827"/>
+                </a:solidFill>
+                <a:latin typeface="Calibri" pitchFamily="34" charset="0"/>
+                <a:ea typeface="Calibri" pitchFamily="34" charset="-122"/>
+                <a:cs typeface="Calibri" pitchFamily="34" charset="-120"/>
+              </a:rPr>
+              <a:t>API Gateway</a:t>
+            </a:r>
+            <a:endParaRPr lang="en-US" sz="1300" dirty="0"/>
+          </a:p>
+        </p:txBody>
+      </p:sp>
+      <p:sp>
+        <p:nvSpPr>
+          <p:cNvPr id="57" name="Text 47"/>
+          <p:cNvSpPr/>
+          <p:nvPr/>
+        </p:nvSpPr>
+        <p:spPr>
+          <a:xfrm>
+            <a:off x="8202168" y="3739896"/>
+            <a:ext cx="1243584" cy="146304"/>
+          </a:xfrm>
+          <a:prstGeom prst="rect">
+            <a:avLst/>
+          </a:prstGeom>
+          <a:noFill/>
+          <a:ln/>
+        </p:spPr>
+        <p:txBody>
+          <a:bodyPr wrap="square" rtlCol="0" anchor="t">
+            <a:noAutofit/>
+          </a:bodyPr>
+          <a:lstStyle/>
+          <a:p>
+            <a:pPr marL="0" indent="0" algn="ctr">
+              <a:buNone/>
+            </a:pPr>
+            <a:r>
+              <a:rPr lang="en-US" sz="800" dirty="0">
+                <a:solidFill>
+                  <a:srgbClr val="6B7280"/>
+                </a:solidFill>
+                <a:latin typeface="Calibri" pitchFamily="34" charset="0"/>
+                <a:ea typeface="Calibri" pitchFamily="34" charset="-122"/>
+                <a:cs typeface="Calibri" pitchFamily="34" charset="-120"/>
+              </a:rPr>
+              <a:t>(Traefik)</a:t>
+            </a:r>
+            <a:endParaRPr lang="en-US" sz="800" dirty="0"/>
+          </a:p>
+        </p:txBody>
+      </p:sp>
+      <p:sp>
+        <p:nvSpPr>
+          <p:cNvPr id="58" name="Shape 48"/>
+          <p:cNvSpPr/>
+          <p:nvPr/>
+        </p:nvSpPr>
+        <p:spPr>
+          <a:xfrm flipV="1">
+            <a:off x="2834639" y="3471203"/>
+            <a:ext cx="526147" cy="12661"/>
+          </a:xfrm>
+          <a:prstGeom prst="line">
+            <a:avLst/>
+          </a:prstGeom>
+          <a:noFill/>
+          <a:ln w="25400">
+            <a:solidFill>
+              <a:srgbClr val="94A3B8"/>
+            </a:solidFill>
+            <a:prstDash val="solid"/>
+            <a:tailEnd type="triangle"/>
+          </a:ln>
+        </p:spPr>
+        <p:txBody>
+          <a:bodyPr/>
+          <a:lstStyle/>
+          <a:p>
+            <a:endParaRPr lang="en-US"/>
+          </a:p>
+        </p:txBody>
+      </p:sp>
+      <p:sp>
+        <p:nvSpPr>
+          <p:cNvPr id="59" name="Shape 49"/>
+          <p:cNvSpPr/>
+          <p:nvPr/>
+        </p:nvSpPr>
+        <p:spPr>
+          <a:xfrm>
+            <a:off x="4480560" y="3483864"/>
+            <a:ext cx="228600" cy="0"/>
+          </a:xfrm>
+          <a:prstGeom prst="line">
+            <a:avLst/>
+          </a:prstGeom>
+          <a:noFill/>
+          <a:ln w="25400">
+            <a:solidFill>
+              <a:srgbClr val="94A3B8"/>
+            </a:solidFill>
+            <a:prstDash val="solid"/>
+            <a:tailEnd type="triangle"/>
+          </a:ln>
+        </p:spPr>
+        <p:txBody>
+          <a:bodyPr/>
+          <a:lstStyle/>
+          <a:p>
+            <a:endParaRPr lang="en-US"/>
+          </a:p>
+        </p:txBody>
+      </p:sp>
+      <p:sp>
+        <p:nvSpPr>
+          <p:cNvPr id="60" name="Shape 50"/>
+          <p:cNvSpPr/>
+          <p:nvPr/>
+        </p:nvSpPr>
+        <p:spPr>
+          <a:xfrm>
+            <a:off x="6172200" y="3483864"/>
+            <a:ext cx="228600" cy="0"/>
+          </a:xfrm>
+          <a:prstGeom prst="line">
+            <a:avLst/>
+          </a:prstGeom>
+          <a:noFill/>
+          <a:ln w="25400">
+            <a:solidFill>
+              <a:srgbClr val="94A3B8"/>
+            </a:solidFill>
+            <a:prstDash val="solid"/>
+            <a:tailEnd type="triangle"/>
+          </a:ln>
+        </p:spPr>
+        <p:txBody>
+          <a:bodyPr/>
+          <a:lstStyle/>
+          <a:p>
+            <a:endParaRPr lang="en-US"/>
+          </a:p>
+        </p:txBody>
+      </p:sp>
+      <p:sp>
+        <p:nvSpPr>
+          <p:cNvPr id="61" name="Shape 51"/>
+          <p:cNvSpPr/>
+          <p:nvPr/>
+        </p:nvSpPr>
+        <p:spPr>
+          <a:xfrm>
+            <a:off x="7863840" y="3483864"/>
+            <a:ext cx="228600" cy="0"/>
+          </a:xfrm>
+          <a:prstGeom prst="line">
+            <a:avLst/>
+          </a:prstGeom>
+          <a:noFill/>
+          <a:ln w="25400">
+            <a:solidFill>
+              <a:srgbClr val="94A3B8"/>
+            </a:solidFill>
+            <a:prstDash val="solid"/>
+            <a:tailEnd type="triangle"/>
+          </a:ln>
+        </p:spPr>
+        <p:txBody>
+          <a:bodyPr/>
+          <a:lstStyle/>
+          <a:p>
+            <a:endParaRPr lang="en-US"/>
+          </a:p>
+        </p:txBody>
+      </p:sp>
+      <p:sp>
+        <p:nvSpPr>
+          <p:cNvPr id="62" name="Shape 52"/>
+          <p:cNvSpPr/>
+          <p:nvPr/>
+        </p:nvSpPr>
+        <p:spPr>
+          <a:xfrm>
+            <a:off x="9921240" y="2148840"/>
+            <a:ext cx="2057400" cy="777240"/>
+          </a:xfrm>
+          <a:prstGeom prst="roundRect">
+            <a:avLst/>
+          </a:prstGeom>
+          <a:solidFill>
+            <a:srgbClr val="FFFFFF"/>
+          </a:solidFill>
+          <a:ln w="12700">
+            <a:solidFill>
+              <a:srgbClr val="CBD5E1"/>
+            </a:solidFill>
+            <a:prstDash val="solid"/>
+          </a:ln>
+          <a:effectLst>
+            <a:outerShdw blurRad="38100" dist="19050" dir="2700000" algn="bl" rotWithShape="0">
+              <a:srgbClr val="000000">
+                <a:alpha val="18000"/>
+              </a:srgbClr>
+            </a:outerShdw>
+          </a:effectLst>
+        </p:spPr>
+        <p:txBody>
+          <a:bodyPr/>
+          <a:lstStyle/>
+          <a:p>
+            <a:endParaRPr lang="en-US"/>
+          </a:p>
+        </p:txBody>
+      </p:sp>
+      <p:sp>
+        <p:nvSpPr>
+          <p:cNvPr id="63" name="Shape 53"/>
+          <p:cNvSpPr/>
+          <p:nvPr/>
+        </p:nvSpPr>
+        <p:spPr>
+          <a:xfrm>
+            <a:off x="10085832" y="2313432"/>
+            <a:ext cx="438912" cy="438912"/>
+          </a:xfrm>
+          <a:prstGeom prst="roundRect">
+            <a:avLst/>
+          </a:prstGeom>
+          <a:solidFill>
+            <a:srgbClr val="EFF6FF"/>
+          </a:solidFill>
+          <a:ln w="12700">
+            <a:solidFill>
+              <a:srgbClr val="FFFFFF">
+                <a:alpha val="0"/>
+              </a:srgbClr>
+            </a:solidFill>
+            <a:prstDash val="solid"/>
+          </a:ln>
+        </p:spPr>
+        <p:txBody>
+          <a:bodyPr/>
+          <a:lstStyle/>
+          <a:p>
+            <a:endParaRPr lang="en-US"/>
+          </a:p>
+        </p:txBody>
+      </p:sp>
+      <p:pic>
+        <p:nvPicPr>
+          <p:cNvPr id="64" name="Image 8" descr="/mnt/data/agentic_icons/apps.png"/>
+          <p:cNvPicPr>
+            <a:picLocks noChangeAspect="1"/>
+          </p:cNvPicPr>
+          <p:nvPr/>
+        </p:nvPicPr>
+        <p:blipFill>
+          <a:blip r:embed="rId8"/>
+          <a:stretch>
+            <a:fillRect/>
+          </a:stretch>
+        </p:blipFill>
+        <p:spPr>
+          <a:xfrm>
+            <a:off x="10177272" y="2404872"/>
+            <a:ext cx="256032" cy="256032"/>
+          </a:xfrm>
+          <a:prstGeom prst="rect">
+            <a:avLst/>
+          </a:prstGeom>
+        </p:spPr>
+      </p:pic>
+      <p:sp>
+        <p:nvSpPr>
+          <p:cNvPr id="65" name="Text 54"/>
+          <p:cNvSpPr/>
+          <p:nvPr/>
+        </p:nvSpPr>
+        <p:spPr>
+          <a:xfrm>
+            <a:off x="10607040" y="2276856"/>
+            <a:ext cx="1234440" cy="274320"/>
+          </a:xfrm>
+          <a:prstGeom prst="rect">
+            <a:avLst/>
+          </a:prstGeom>
+          <a:noFill/>
+          <a:ln/>
+        </p:spPr>
+        <p:txBody>
+          <a:bodyPr wrap="square" rtlCol="0" anchor="ctr"/>
+          <a:lstStyle/>
+          <a:p>
+            <a:pPr marL="0" indent="0">
+              <a:buNone/>
+            </a:pPr>
+            <a:r>
+              <a:rPr lang="en-US" sz="1500" b="1" dirty="0">
+                <a:solidFill>
+                  <a:srgbClr val="111827"/>
+                </a:solidFill>
+                <a:latin typeface="Calibri" pitchFamily="34" charset="0"/>
+                <a:ea typeface="Calibri" pitchFamily="34" charset="-122"/>
+                <a:cs typeface="Calibri" pitchFamily="34" charset="-120"/>
+              </a:rPr>
+              <a:t>Social Apps</a:t>
+            </a:r>
+            <a:endParaRPr lang="en-US" sz="1500" dirty="0"/>
+          </a:p>
+        </p:txBody>
+      </p:sp>
+      <p:sp>
+        <p:nvSpPr>
+          <p:cNvPr id="66" name="Text 55"/>
+          <p:cNvSpPr/>
+          <p:nvPr/>
+        </p:nvSpPr>
+        <p:spPr>
+          <a:xfrm>
+            <a:off x="10607040" y="2551176"/>
+            <a:ext cx="1234440" cy="338328"/>
+          </a:xfrm>
+          <a:prstGeom prst="rect">
+            <a:avLst/>
+          </a:prstGeom>
+          <a:noFill/>
+          <a:ln/>
+        </p:spPr>
+        <p:txBody>
+          <a:bodyPr wrap="square" rtlCol="0" anchor="ctr"/>
+          <a:lstStyle/>
+          <a:p>
+            <a:pPr marL="0" indent="0">
+              <a:buNone/>
+            </a:pPr>
+            <a:r>
+              <a:rPr lang="en-US" sz="1100" dirty="0">
+                <a:solidFill>
+                  <a:srgbClr val="6B7280"/>
+                </a:solidFill>
+                <a:latin typeface="Calibri" pitchFamily="34" charset="0"/>
+                <a:ea typeface="Calibri" pitchFamily="34" charset="-122"/>
+                <a:cs typeface="Calibri" pitchFamily="34" charset="-120"/>
+              </a:rPr>
+              <a:t>(e.g., LinkedIn, Gmail)</a:t>
+            </a:r>
+            <a:endParaRPr lang="en-US" sz="1100" dirty="0"/>
+          </a:p>
+        </p:txBody>
+      </p:sp>
+      <p:sp>
+        <p:nvSpPr>
+          <p:cNvPr id="67" name="Shape 56"/>
+          <p:cNvSpPr/>
+          <p:nvPr/>
+        </p:nvSpPr>
+        <p:spPr>
+          <a:xfrm>
+            <a:off x="9921240" y="3154680"/>
+            <a:ext cx="2057400" cy="777240"/>
+          </a:xfrm>
+          <a:prstGeom prst="roundRect">
+            <a:avLst/>
+          </a:prstGeom>
+          <a:solidFill>
+            <a:srgbClr val="FFFFFF"/>
+          </a:solidFill>
+          <a:ln w="12700">
+            <a:solidFill>
+              <a:srgbClr val="CBD5E1"/>
+            </a:solidFill>
+            <a:prstDash val="solid"/>
+          </a:ln>
+          <a:effectLst>
+            <a:outerShdw blurRad="38100" dist="19050" dir="2700000" algn="bl" rotWithShape="0">
+              <a:srgbClr val="000000">
+                <a:alpha val="18000"/>
+              </a:srgbClr>
+            </a:outerShdw>
+          </a:effectLst>
+        </p:spPr>
+        <p:txBody>
+          <a:bodyPr/>
+          <a:lstStyle/>
+          <a:p>
+            <a:endParaRPr lang="en-US"/>
+          </a:p>
+        </p:txBody>
+      </p:sp>
+      <p:sp>
+        <p:nvSpPr>
+          <p:cNvPr id="68" name="Shape 57"/>
+          <p:cNvSpPr/>
+          <p:nvPr/>
+        </p:nvSpPr>
+        <p:spPr>
+          <a:xfrm>
+            <a:off x="10085832" y="3319272"/>
+            <a:ext cx="438912" cy="438912"/>
+          </a:xfrm>
+          <a:prstGeom prst="roundRect">
+            <a:avLst/>
+          </a:prstGeom>
+          <a:solidFill>
+            <a:srgbClr val="EFF6FF"/>
+          </a:solidFill>
+          <a:ln w="12700">
+            <a:solidFill>
+              <a:srgbClr val="FFFFFF">
+                <a:alpha val="0"/>
+              </a:srgbClr>
+            </a:solidFill>
+            <a:prstDash val="solid"/>
+          </a:ln>
+        </p:spPr>
+        <p:txBody>
+          <a:bodyPr/>
+          <a:lstStyle/>
+          <a:p>
+            <a:endParaRPr lang="en-US"/>
+          </a:p>
+        </p:txBody>
+      </p:sp>
+      <p:pic>
+        <p:nvPicPr>
+          <p:cNvPr id="69" name="Image 9" descr="/mnt/data/agentic_icons/apps.png"/>
+          <p:cNvPicPr>
+            <a:picLocks noChangeAspect="1"/>
+          </p:cNvPicPr>
+          <p:nvPr/>
+        </p:nvPicPr>
+        <p:blipFill>
+          <a:blip r:embed="rId8"/>
+          <a:stretch>
+            <a:fillRect/>
+          </a:stretch>
+        </p:blipFill>
+        <p:spPr>
+          <a:xfrm>
+            <a:off x="10177272" y="3410712"/>
+            <a:ext cx="256032" cy="256032"/>
+          </a:xfrm>
+          <a:prstGeom prst="rect">
+            <a:avLst/>
+          </a:prstGeom>
+        </p:spPr>
+      </p:pic>
+      <p:sp>
+        <p:nvSpPr>
+          <p:cNvPr id="70" name="Text 58"/>
+          <p:cNvSpPr/>
+          <p:nvPr/>
+        </p:nvSpPr>
+        <p:spPr>
+          <a:xfrm>
+            <a:off x="10538460" y="3258633"/>
+            <a:ext cx="1234440" cy="274320"/>
+          </a:xfrm>
+          <a:prstGeom prst="rect">
+            <a:avLst/>
+          </a:prstGeom>
+          <a:noFill/>
+          <a:ln/>
+        </p:spPr>
+        <p:txBody>
+          <a:bodyPr wrap="square" rtlCol="0" anchor="ctr"/>
+          <a:lstStyle/>
+          <a:p>
+            <a:pPr marL="0" indent="0">
+              <a:buNone/>
+            </a:pPr>
+            <a:r>
+              <a:rPr lang="en-US" sz="1500" b="1" dirty="0">
+                <a:solidFill>
+                  <a:srgbClr val="111827"/>
+                </a:solidFill>
+                <a:latin typeface="Calibri" pitchFamily="34" charset="0"/>
+                <a:ea typeface="Calibri" pitchFamily="34" charset="-122"/>
+                <a:cs typeface="Calibri" pitchFamily="34" charset="-120"/>
+              </a:rPr>
+              <a:t>Enterprise Apps</a:t>
+            </a:r>
+            <a:endParaRPr lang="en-US" sz="1500" dirty="0"/>
+          </a:p>
+        </p:txBody>
+      </p:sp>
+      <p:sp>
+        <p:nvSpPr>
+          <p:cNvPr id="71" name="Text 59"/>
+          <p:cNvSpPr/>
+          <p:nvPr/>
+        </p:nvSpPr>
+        <p:spPr>
+          <a:xfrm>
+            <a:off x="10547604" y="3607067"/>
+            <a:ext cx="1371601" cy="338328"/>
+          </a:xfrm>
+          <a:prstGeom prst="rect">
+            <a:avLst/>
+          </a:prstGeom>
+          <a:noFill/>
+          <a:ln/>
+        </p:spPr>
+        <p:txBody>
+          <a:bodyPr wrap="square" rtlCol="0" anchor="ctr"/>
+          <a:lstStyle/>
+          <a:p>
+            <a:pPr marL="0" indent="0">
+              <a:buNone/>
+            </a:pPr>
+            <a:r>
+              <a:rPr lang="en-US" sz="1100" dirty="0">
+                <a:solidFill>
+                  <a:srgbClr val="6B7280"/>
+                </a:solidFill>
+                <a:latin typeface="Calibri" pitchFamily="34" charset="0"/>
+                <a:ea typeface="Calibri" pitchFamily="34" charset="-122"/>
+                <a:cs typeface="Calibri" pitchFamily="34" charset="-120"/>
+              </a:rPr>
+              <a:t>(e.g., SAP, ServiceNow)</a:t>
+            </a:r>
+            <a:endParaRPr lang="en-US" sz="1100" dirty="0"/>
+          </a:p>
+        </p:txBody>
+      </p:sp>
+      <p:sp>
+        <p:nvSpPr>
+          <p:cNvPr id="72" name="Shape 60"/>
+          <p:cNvSpPr/>
+          <p:nvPr/>
+        </p:nvSpPr>
+        <p:spPr>
+          <a:xfrm>
+            <a:off x="9921240" y="4160520"/>
+            <a:ext cx="2057400" cy="777240"/>
+          </a:xfrm>
+          <a:prstGeom prst="roundRect">
+            <a:avLst/>
+          </a:prstGeom>
+          <a:solidFill>
+            <a:srgbClr val="FFFFFF"/>
+          </a:solidFill>
+          <a:ln w="12700">
+            <a:solidFill>
+              <a:srgbClr val="CBD5E1"/>
+            </a:solidFill>
+            <a:prstDash val="solid"/>
+          </a:ln>
+          <a:effectLst>
+            <a:outerShdw blurRad="38100" dist="19050" dir="2700000" algn="bl" rotWithShape="0">
+              <a:srgbClr val="000000">
+                <a:alpha val="18000"/>
+              </a:srgbClr>
+            </a:outerShdw>
+          </a:effectLst>
+        </p:spPr>
+        <p:txBody>
+          <a:bodyPr/>
+          <a:lstStyle/>
+          <a:p>
+            <a:endParaRPr lang="en-US"/>
+          </a:p>
+        </p:txBody>
+      </p:sp>
+      <p:sp>
+        <p:nvSpPr>
+          <p:cNvPr id="73" name="Shape 61"/>
+          <p:cNvSpPr/>
+          <p:nvPr/>
+        </p:nvSpPr>
+        <p:spPr>
+          <a:xfrm>
+            <a:off x="10085832" y="4325112"/>
+            <a:ext cx="438912" cy="438912"/>
+          </a:xfrm>
+          <a:prstGeom prst="roundRect">
+            <a:avLst/>
+          </a:prstGeom>
+          <a:solidFill>
+            <a:srgbClr val="EFF6FF"/>
+          </a:solidFill>
+          <a:ln w="12700">
+            <a:solidFill>
+              <a:srgbClr val="FFFFFF">
+                <a:alpha val="0"/>
+              </a:srgbClr>
+            </a:solidFill>
+            <a:prstDash val="solid"/>
+          </a:ln>
+        </p:spPr>
+        <p:txBody>
+          <a:bodyPr/>
+          <a:lstStyle/>
+          <a:p>
+            <a:endParaRPr lang="en-US"/>
+          </a:p>
+        </p:txBody>
+      </p:sp>
+      <p:pic>
+        <p:nvPicPr>
+          <p:cNvPr id="74" name="Image 10" descr="/mnt/data/agentic_icons/apps.png"/>
+          <p:cNvPicPr>
+            <a:picLocks noChangeAspect="1"/>
+          </p:cNvPicPr>
+          <p:nvPr/>
+        </p:nvPicPr>
+        <p:blipFill>
+          <a:blip r:embed="rId8"/>
+          <a:stretch>
+            <a:fillRect/>
+          </a:stretch>
+        </p:blipFill>
+        <p:spPr>
+          <a:xfrm>
+            <a:off x="10177272" y="4416552"/>
+            <a:ext cx="256032" cy="256032"/>
+          </a:xfrm>
+          <a:prstGeom prst="rect">
+            <a:avLst/>
+          </a:prstGeom>
+        </p:spPr>
+      </p:pic>
+      <p:sp>
+        <p:nvSpPr>
+          <p:cNvPr id="75" name="Text 62"/>
+          <p:cNvSpPr/>
+          <p:nvPr/>
+        </p:nvSpPr>
+        <p:spPr>
+          <a:xfrm>
+            <a:off x="10607040" y="4288536"/>
+            <a:ext cx="1234440" cy="274320"/>
+          </a:xfrm>
+          <a:prstGeom prst="rect">
+            <a:avLst/>
+          </a:prstGeom>
+          <a:noFill/>
+          <a:ln/>
+        </p:spPr>
+        <p:txBody>
+          <a:bodyPr wrap="square" rtlCol="0" anchor="ctr"/>
+          <a:lstStyle/>
+          <a:p>
+            <a:pPr marL="0" indent="0">
+              <a:buNone/>
+            </a:pPr>
+            <a:r>
+              <a:rPr lang="en-US" sz="1500" b="1" dirty="0">
+                <a:solidFill>
+                  <a:srgbClr val="111827"/>
+                </a:solidFill>
+                <a:latin typeface="Calibri" pitchFamily="34" charset="0"/>
+                <a:ea typeface="Calibri" pitchFamily="34" charset="-122"/>
+                <a:cs typeface="Calibri" pitchFamily="34" charset="-120"/>
+              </a:rPr>
+              <a:t>In-house REST Apps</a:t>
+            </a:r>
+            <a:endParaRPr lang="en-US" sz="1500" dirty="0"/>
+          </a:p>
+        </p:txBody>
+      </p:sp>
+      <p:sp>
+        <p:nvSpPr>
+          <p:cNvPr id="76" name="Shape 63"/>
+          <p:cNvSpPr/>
+          <p:nvPr/>
+        </p:nvSpPr>
+        <p:spPr>
+          <a:xfrm flipV="1">
+            <a:off x="9555480" y="2752344"/>
+            <a:ext cx="393192" cy="731520"/>
+          </a:xfrm>
+          <a:prstGeom prst="line">
+            <a:avLst/>
+          </a:prstGeom>
+          <a:noFill/>
+          <a:ln w="25400">
+            <a:solidFill>
+              <a:srgbClr val="94A3B8"/>
+            </a:solidFill>
+            <a:prstDash val="solid"/>
+            <a:tailEnd type="triangle"/>
+          </a:ln>
+        </p:spPr>
+        <p:txBody>
+          <a:bodyPr/>
+          <a:lstStyle/>
+          <a:p>
+            <a:endParaRPr lang="en-US"/>
+          </a:p>
+        </p:txBody>
+      </p:sp>
+      <p:sp>
+        <p:nvSpPr>
+          <p:cNvPr id="77" name="Shape 64"/>
+          <p:cNvSpPr/>
+          <p:nvPr/>
+        </p:nvSpPr>
+        <p:spPr>
+          <a:xfrm>
+            <a:off x="9555480" y="3483864"/>
+            <a:ext cx="365760" cy="59436"/>
+          </a:xfrm>
+          <a:prstGeom prst="line">
+            <a:avLst/>
+          </a:prstGeom>
+          <a:noFill/>
+          <a:ln w="25400">
+            <a:solidFill>
+              <a:srgbClr val="94A3B8"/>
+            </a:solidFill>
+            <a:prstDash val="solid"/>
+            <a:tailEnd type="triangle"/>
+          </a:ln>
+        </p:spPr>
+        <p:txBody>
+          <a:bodyPr/>
+          <a:lstStyle/>
+          <a:p>
+            <a:endParaRPr lang="en-US"/>
+          </a:p>
+        </p:txBody>
+      </p:sp>
+      <p:sp>
+        <p:nvSpPr>
+          <p:cNvPr id="78" name="Shape 65"/>
+          <p:cNvSpPr/>
+          <p:nvPr/>
+        </p:nvSpPr>
+        <p:spPr>
+          <a:xfrm>
+            <a:off x="9555480" y="3483864"/>
+            <a:ext cx="365760" cy="1065276"/>
+          </a:xfrm>
+          <a:prstGeom prst="line">
+            <a:avLst/>
+          </a:prstGeom>
+          <a:noFill/>
+          <a:ln w="25400">
+            <a:solidFill>
+              <a:srgbClr val="94A3B8"/>
+            </a:solidFill>
+            <a:prstDash val="solid"/>
+            <a:tailEnd type="triangle"/>
+          </a:ln>
+        </p:spPr>
+        <p:txBody>
+          <a:bodyPr/>
+          <a:lstStyle/>
+          <a:p>
+            <a:endParaRPr lang="en-US"/>
+          </a:p>
+        </p:txBody>
+      </p:sp>
+      <p:grpSp>
+        <p:nvGrpSpPr>
+          <p:cNvPr id="108" name="Group 107">
+            <a:extLst>
+              <a:ext uri="{FF2B5EF4-FFF2-40B4-BE49-F238E27FC236}">
+                <a16:creationId xmlns:a16="http://schemas.microsoft.com/office/drawing/2014/main" id="{C5C6A403-EDD6-8837-CA82-5A19B55E7919}"/>
+              </a:ext>
+            </a:extLst>
+          </p:cNvPr>
+          <p:cNvGrpSpPr/>
+          <p:nvPr/>
+        </p:nvGrpSpPr>
+        <p:grpSpPr>
+          <a:xfrm>
+            <a:off x="3997042" y="4957684"/>
+            <a:ext cx="5574867" cy="1380743"/>
+            <a:chOff x="3706293" y="4837175"/>
+            <a:chExt cx="5574867" cy="1380743"/>
+          </a:xfrm>
+        </p:grpSpPr>
+        <p:sp>
+          <p:nvSpPr>
+            <p:cNvPr id="103" name="Shape 23">
+              <a:extLst>
+                <a:ext uri="{FF2B5EF4-FFF2-40B4-BE49-F238E27FC236}">
+                  <a16:creationId xmlns:a16="http://schemas.microsoft.com/office/drawing/2014/main" id="{C9EECC66-30DB-0111-9EAE-C531A20DC8F9}"/>
+                </a:ext>
+              </a:extLst>
+            </p:cNvPr>
+            <p:cNvSpPr/>
+            <p:nvPr/>
+          </p:nvSpPr>
+          <p:spPr>
+            <a:xfrm>
+              <a:off x="3706293" y="4837175"/>
+              <a:ext cx="5381208" cy="1380743"/>
+            </a:xfrm>
+            <a:prstGeom prst="roundRect">
+              <a:avLst/>
+            </a:prstGeom>
+            <a:solidFill>
+              <a:schemeClr val="bg1">
+                <a:lumMod val="95000"/>
+              </a:schemeClr>
+            </a:solidFill>
+            <a:ln w="12700">
+              <a:solidFill>
+                <a:srgbClr val="CBD5E1"/>
+              </a:solidFill>
+              <a:prstDash val="solid"/>
+            </a:ln>
+            <a:effectLst>
+              <a:outerShdw blurRad="38100" dist="15240" dir="2700000" algn="bl" rotWithShape="0">
+                <a:srgbClr val="000000">
+                  <a:alpha val="14000"/>
+                </a:srgbClr>
+              </a:outerShdw>
+            </a:effectLst>
+          </p:spPr>
+          <p:txBody>
+            <a:bodyPr/>
+            <a:lstStyle/>
+            <a:p>
+              <a:endParaRPr lang="en-US"/>
+            </a:p>
+          </p:txBody>
+        </p:sp>
+        <p:grpSp>
+          <p:nvGrpSpPr>
+            <p:cNvPr id="101" name="Group 100">
+              <a:extLst>
+                <a:ext uri="{FF2B5EF4-FFF2-40B4-BE49-F238E27FC236}">
+                  <a16:creationId xmlns:a16="http://schemas.microsoft.com/office/drawing/2014/main" id="{B383FF5E-E3BC-AAAE-3651-8E502D6CDD41}"/>
+                </a:ext>
+              </a:extLst>
+            </p:cNvPr>
+            <p:cNvGrpSpPr/>
+            <p:nvPr/>
+          </p:nvGrpSpPr>
+          <p:grpSpPr>
+            <a:xfrm>
+              <a:off x="3959352" y="5084064"/>
+              <a:ext cx="2010268" cy="941832"/>
+              <a:chOff x="3959352" y="5084064"/>
+              <a:chExt cx="2010268" cy="941832"/>
+            </a:xfrm>
+          </p:grpSpPr>
+          <p:sp>
+            <p:nvSpPr>
+              <p:cNvPr id="79" name="Shape 66"/>
+              <p:cNvSpPr/>
+              <p:nvPr/>
+            </p:nvSpPr>
+            <p:spPr>
+              <a:xfrm>
+                <a:off x="3959352" y="5084064"/>
+                <a:ext cx="2010268" cy="941832"/>
+              </a:xfrm>
+              <a:prstGeom prst="can">
+                <a:avLst/>
+              </a:prstGeom>
+              <a:solidFill>
+                <a:srgbClr val="FFFFFF"/>
+              </a:solidFill>
+              <a:ln w="12700">
+                <a:solidFill>
+                  <a:srgbClr val="CBD5E1"/>
+                </a:solidFill>
+                <a:prstDash val="solid"/>
+              </a:ln>
+              <a:effectLst>
+                <a:outerShdw blurRad="38100" dist="12700" dir="2700000" algn="bl" rotWithShape="0">
+                  <a:srgbClr val="000000">
+                    <a:alpha val="12000"/>
+                  </a:srgbClr>
+                </a:outerShdw>
+              </a:effectLst>
+            </p:spPr>
+            <p:txBody>
+              <a:bodyPr/>
+              <a:lstStyle/>
+              <a:p>
+                <a:endParaRPr lang="en-US" dirty="0"/>
+              </a:p>
+            </p:txBody>
+          </p:sp>
+          <p:pic>
+            <p:nvPicPr>
+              <p:cNvPr id="80" name="Image 11" descr="/mnt/data/agentic_icons/graph.png"/>
+              <p:cNvPicPr>
+                <a:picLocks noChangeAspect="1"/>
+              </p:cNvPicPr>
+              <p:nvPr/>
+            </p:nvPicPr>
+            <p:blipFill>
+              <a:blip r:embed="rId9"/>
+              <a:stretch>
+                <a:fillRect/>
+              </a:stretch>
+            </p:blipFill>
+            <p:spPr>
+              <a:xfrm>
+                <a:off x="4050792" y="5468112"/>
+                <a:ext cx="384048" cy="384048"/>
+              </a:xfrm>
+              <a:prstGeom prst="rect">
+                <a:avLst/>
+              </a:prstGeom>
+            </p:spPr>
+          </p:pic>
+          <p:sp>
+            <p:nvSpPr>
+              <p:cNvPr id="81" name="Text 67"/>
+              <p:cNvSpPr/>
+              <p:nvPr/>
+            </p:nvSpPr>
+            <p:spPr>
+              <a:xfrm>
+                <a:off x="4389120" y="5376672"/>
+                <a:ext cx="1506158" cy="274320"/>
+              </a:xfrm>
+              <a:prstGeom prst="rect">
+                <a:avLst/>
+              </a:prstGeom>
+              <a:noFill/>
+              <a:ln/>
+            </p:spPr>
+            <p:txBody>
+              <a:bodyPr wrap="square" rtlCol="0" anchor="ctr"/>
+              <a:lstStyle/>
+              <a:p>
+                <a:pPr marL="0" indent="0">
+                  <a:buNone/>
+                </a:pPr>
+                <a:r>
+                  <a:rPr lang="en-US" sz="1400" b="1" dirty="0">
+                    <a:solidFill>
+                      <a:srgbClr val="111827"/>
+                    </a:solidFill>
+                    <a:latin typeface="Calibri" pitchFamily="34" charset="0"/>
+                    <a:ea typeface="Calibri" pitchFamily="34" charset="-122"/>
+                    <a:cs typeface="Calibri" pitchFamily="34" charset="-120"/>
+                  </a:rPr>
+                  <a:t>Knowledge Graph</a:t>
+                </a:r>
+                <a:endParaRPr lang="en-US" sz="1400" dirty="0"/>
+              </a:p>
+            </p:txBody>
+          </p:sp>
+          <p:sp>
+            <p:nvSpPr>
+              <p:cNvPr id="82" name="Text 68"/>
+              <p:cNvSpPr/>
+              <p:nvPr/>
+            </p:nvSpPr>
+            <p:spPr>
+              <a:xfrm>
+                <a:off x="4745262" y="5669280"/>
+                <a:ext cx="800100" cy="274320"/>
+              </a:xfrm>
+              <a:prstGeom prst="rect">
+                <a:avLst/>
+              </a:prstGeom>
+              <a:noFill/>
+              <a:ln/>
+            </p:spPr>
+            <p:txBody>
+              <a:bodyPr wrap="square" rtlCol="0" anchor="ctr"/>
+              <a:lstStyle/>
+              <a:p>
+                <a:pPr marL="0" indent="0">
+                  <a:buNone/>
+                </a:pPr>
+                <a:r>
+                  <a:rPr lang="en-US" sz="1200" dirty="0">
+                    <a:solidFill>
+                      <a:srgbClr val="6B7280"/>
+                    </a:solidFill>
+                    <a:latin typeface="Calibri" pitchFamily="34" charset="0"/>
+                    <a:ea typeface="Calibri" pitchFamily="34" charset="-122"/>
+                    <a:cs typeface="Calibri" pitchFamily="34" charset="-120"/>
+                  </a:rPr>
+                  <a:t>(Neo4j)</a:t>
+                </a:r>
+                <a:endParaRPr lang="en-US" sz="1200" dirty="0"/>
+              </a:p>
+            </p:txBody>
+          </p:sp>
+        </p:grpSp>
+        <p:grpSp>
+          <p:nvGrpSpPr>
+            <p:cNvPr id="98" name="Group 97">
+              <a:extLst>
+                <a:ext uri="{FF2B5EF4-FFF2-40B4-BE49-F238E27FC236}">
+                  <a16:creationId xmlns:a16="http://schemas.microsoft.com/office/drawing/2014/main" id="{C25CDEB1-3DE6-604B-1E59-6036036FAD73}"/>
+                </a:ext>
+              </a:extLst>
+            </p:cNvPr>
+            <p:cNvGrpSpPr/>
+            <p:nvPr/>
+          </p:nvGrpSpPr>
+          <p:grpSpPr>
+            <a:xfrm>
+              <a:off x="6733032" y="5084064"/>
+              <a:ext cx="1972056" cy="987552"/>
+              <a:chOff x="6733032" y="5084064"/>
+              <a:chExt cx="1972056" cy="987552"/>
+            </a:xfrm>
+          </p:grpSpPr>
+          <p:sp>
+            <p:nvSpPr>
+              <p:cNvPr id="83" name="Shape 69"/>
+              <p:cNvSpPr/>
+              <p:nvPr/>
+            </p:nvSpPr>
+            <p:spPr>
+              <a:xfrm>
+                <a:off x="6733032" y="5084064"/>
+                <a:ext cx="1972056" cy="987552"/>
+              </a:xfrm>
+              <a:prstGeom prst="can">
+                <a:avLst/>
+              </a:prstGeom>
+              <a:solidFill>
+                <a:srgbClr val="FFFFFF"/>
+              </a:solidFill>
+              <a:ln w="12700">
+                <a:solidFill>
+                  <a:srgbClr val="CBD5E1"/>
+                </a:solidFill>
+                <a:prstDash val="solid"/>
+              </a:ln>
+              <a:effectLst>
+                <a:outerShdw blurRad="38100" dist="12700" dir="2700000" algn="bl" rotWithShape="0">
+                  <a:srgbClr val="000000">
+                    <a:alpha val="12000"/>
+                  </a:srgbClr>
+                </a:outerShdw>
+              </a:effectLst>
+            </p:spPr>
+            <p:txBody>
+              <a:bodyPr/>
+              <a:lstStyle/>
+              <a:p>
+                <a:endParaRPr lang="en-US" dirty="0"/>
+              </a:p>
+            </p:txBody>
+          </p:sp>
+          <p:pic>
+            <p:nvPicPr>
+              <p:cNvPr id="84" name="Image 12" descr="/mnt/data/agentic_icons/db.png"/>
+              <p:cNvPicPr>
+                <a:picLocks noChangeAspect="1"/>
+              </p:cNvPicPr>
+              <p:nvPr/>
+            </p:nvPicPr>
+            <p:blipFill>
+              <a:blip r:embed="rId10"/>
+              <a:stretch>
+                <a:fillRect/>
+              </a:stretch>
+            </p:blipFill>
+            <p:spPr>
+              <a:xfrm>
+                <a:off x="6858000" y="5468112"/>
+                <a:ext cx="384048" cy="384048"/>
+              </a:xfrm>
+              <a:prstGeom prst="rect">
+                <a:avLst/>
+              </a:prstGeom>
+            </p:spPr>
+          </p:pic>
+        </p:grpSp>
+        <p:sp>
+          <p:nvSpPr>
+            <p:cNvPr id="85" name="Text 70"/>
+            <p:cNvSpPr/>
+            <p:nvPr/>
+          </p:nvSpPr>
+          <p:spPr>
+            <a:xfrm>
+              <a:off x="7315200" y="5376672"/>
+              <a:ext cx="1965960" cy="274320"/>
+            </a:xfrm>
+            <a:prstGeom prst="rect">
+              <a:avLst/>
+            </a:prstGeom>
+            <a:noFill/>
+            <a:ln/>
+          </p:spPr>
+          <p:txBody>
+            <a:bodyPr wrap="square" rtlCol="0" anchor="ctr"/>
+            <a:lstStyle/>
+            <a:p>
+              <a:pPr marL="0" indent="0">
+                <a:buNone/>
+              </a:pPr>
+              <a:r>
+                <a:rPr lang="en-US" sz="1400" b="1" dirty="0">
+                  <a:solidFill>
+                    <a:srgbClr val="111827"/>
+                  </a:solidFill>
+                  <a:latin typeface="Calibri" pitchFamily="34" charset="0"/>
+                  <a:ea typeface="Calibri" pitchFamily="34" charset="-122"/>
+                  <a:cs typeface="Calibri" pitchFamily="34" charset="-120"/>
+                </a:rPr>
+                <a:t>Vector DB</a:t>
+              </a:r>
+              <a:endParaRPr lang="en-US" sz="1400" dirty="0"/>
+            </a:p>
+          </p:txBody>
+        </p:sp>
+        <p:sp>
+          <p:nvSpPr>
+            <p:cNvPr id="86" name="Text 71"/>
+            <p:cNvSpPr/>
+            <p:nvPr/>
+          </p:nvSpPr>
+          <p:spPr>
+            <a:xfrm>
+              <a:off x="7315200" y="5669280"/>
+              <a:ext cx="1965960" cy="274320"/>
+            </a:xfrm>
+            <a:prstGeom prst="rect">
+              <a:avLst/>
+            </a:prstGeom>
+            <a:noFill/>
+            <a:ln/>
+          </p:spPr>
+          <p:txBody>
+            <a:bodyPr wrap="square" rtlCol="0" anchor="ctr"/>
+            <a:lstStyle/>
+            <a:p>
+              <a:pPr marL="0" indent="0">
+                <a:buNone/>
+              </a:pPr>
+              <a:r>
+                <a:rPr lang="en-US" sz="1200" dirty="0">
+                  <a:solidFill>
+                    <a:srgbClr val="6B7280"/>
+                  </a:solidFill>
+                  <a:latin typeface="Calibri" pitchFamily="34" charset="0"/>
+                  <a:ea typeface="Calibri" pitchFamily="34" charset="-122"/>
+                  <a:cs typeface="Calibri" pitchFamily="34" charset="-120"/>
+                </a:rPr>
+                <a:t>(PostgreSQL)</a:t>
+              </a:r>
+              <a:endParaRPr lang="en-US" sz="1200" dirty="0"/>
+            </a:p>
+          </p:txBody>
+        </p:sp>
+      </p:grpSp>
+      <p:sp>
+        <p:nvSpPr>
+          <p:cNvPr id="87" name="Shape 72"/>
+          <p:cNvSpPr/>
+          <p:nvPr/>
+        </p:nvSpPr>
+        <p:spPr>
+          <a:xfrm>
+            <a:off x="6492240" y="2560320"/>
+            <a:ext cx="0" cy="301752"/>
+          </a:xfrm>
+          <a:prstGeom prst="line">
+            <a:avLst/>
+          </a:prstGeom>
+          <a:noFill/>
+          <a:ln w="25400">
+            <a:solidFill>
+              <a:srgbClr val="94A3B8"/>
+            </a:solidFill>
+            <a:prstDash val="solid"/>
+          </a:ln>
+        </p:spPr>
+        <p:txBody>
+          <a:bodyPr/>
+          <a:lstStyle/>
+          <a:p>
+            <a:endParaRPr lang="en-US"/>
+          </a:p>
+        </p:txBody>
+      </p:sp>
+      <p:sp>
+        <p:nvSpPr>
+          <p:cNvPr id="88" name="Shape 73"/>
+          <p:cNvSpPr/>
+          <p:nvPr/>
+        </p:nvSpPr>
+        <p:spPr>
+          <a:xfrm>
+            <a:off x="5440680" y="2862072"/>
+            <a:ext cx="1051560" cy="0"/>
+          </a:xfrm>
+          <a:prstGeom prst="line">
+            <a:avLst/>
+          </a:prstGeom>
+          <a:noFill/>
+          <a:ln w="25400">
+            <a:solidFill>
+              <a:srgbClr val="94A3B8"/>
+            </a:solidFill>
+            <a:prstDash val="solid"/>
+          </a:ln>
+        </p:spPr>
+        <p:txBody>
+          <a:bodyPr/>
+          <a:lstStyle/>
+          <a:p>
+            <a:endParaRPr lang="en-US"/>
+          </a:p>
+        </p:txBody>
+      </p:sp>
+      <p:sp>
+        <p:nvSpPr>
+          <p:cNvPr id="89" name="Shape 74"/>
+          <p:cNvSpPr/>
+          <p:nvPr/>
+        </p:nvSpPr>
+        <p:spPr>
+          <a:xfrm>
+            <a:off x="6492240" y="2862072"/>
+            <a:ext cx="640080" cy="0"/>
+          </a:xfrm>
+          <a:prstGeom prst="line">
+            <a:avLst/>
+          </a:prstGeom>
+          <a:noFill/>
+          <a:ln w="25400">
+            <a:solidFill>
+              <a:srgbClr val="94A3B8"/>
+            </a:solidFill>
+            <a:prstDash val="solid"/>
+          </a:ln>
+        </p:spPr>
+        <p:txBody>
+          <a:bodyPr/>
+          <a:lstStyle/>
+          <a:p>
+            <a:endParaRPr lang="en-US"/>
+          </a:p>
+        </p:txBody>
+      </p:sp>
+      <p:sp>
+        <p:nvSpPr>
+          <p:cNvPr id="90" name="Shape 75"/>
+          <p:cNvSpPr/>
+          <p:nvPr/>
+        </p:nvSpPr>
+        <p:spPr>
+          <a:xfrm>
+            <a:off x="5440680" y="2862072"/>
+            <a:ext cx="0" cy="201168"/>
+          </a:xfrm>
+          <a:prstGeom prst="line">
+            <a:avLst/>
+          </a:prstGeom>
+          <a:noFill/>
+          <a:ln w="25400">
+            <a:solidFill>
+              <a:srgbClr val="94A3B8"/>
+            </a:solidFill>
+            <a:prstDash val="solid"/>
+          </a:ln>
+        </p:spPr>
+        <p:txBody>
+          <a:bodyPr/>
+          <a:lstStyle/>
+          <a:p>
+            <a:endParaRPr lang="en-US"/>
+          </a:p>
+        </p:txBody>
+      </p:sp>
+      <p:sp>
+        <p:nvSpPr>
+          <p:cNvPr id="91" name="Shape 76"/>
+          <p:cNvSpPr/>
+          <p:nvPr/>
+        </p:nvSpPr>
+        <p:spPr>
+          <a:xfrm>
+            <a:off x="7132320" y="2862072"/>
+            <a:ext cx="0" cy="201168"/>
+          </a:xfrm>
+          <a:prstGeom prst="line">
+            <a:avLst/>
+          </a:prstGeom>
+          <a:noFill/>
+          <a:ln w="25400">
+            <a:solidFill>
+              <a:srgbClr val="94A3B8"/>
+            </a:solidFill>
+            <a:prstDash val="solid"/>
+          </a:ln>
+        </p:spPr>
+        <p:txBody>
+          <a:bodyPr/>
+          <a:lstStyle/>
+          <a:p>
+            <a:endParaRPr lang="en-US"/>
+          </a:p>
+        </p:txBody>
+      </p:sp>
+      <p:sp>
+        <p:nvSpPr>
+          <p:cNvPr id="92" name="Shape 77"/>
+          <p:cNvSpPr/>
+          <p:nvPr/>
+        </p:nvSpPr>
+        <p:spPr>
+          <a:xfrm>
+            <a:off x="5097780" y="3904488"/>
+            <a:ext cx="224028" cy="1179576"/>
+          </a:xfrm>
+          <a:prstGeom prst="line">
+            <a:avLst/>
+          </a:prstGeom>
+          <a:noFill/>
+          <a:ln w="25400">
+            <a:solidFill>
+              <a:srgbClr val="94A3B8"/>
+            </a:solidFill>
+            <a:prstDash val="solid"/>
+          </a:ln>
+        </p:spPr>
+        <p:txBody>
+          <a:bodyPr/>
+          <a:lstStyle/>
+          <a:p>
+            <a:endParaRPr lang="en-US"/>
+          </a:p>
+        </p:txBody>
+      </p:sp>
+      <p:sp>
+        <p:nvSpPr>
+          <p:cNvPr id="93" name="Shape 78"/>
+          <p:cNvSpPr/>
+          <p:nvPr/>
+        </p:nvSpPr>
+        <p:spPr>
+          <a:xfrm>
+            <a:off x="7118604" y="3863340"/>
+            <a:ext cx="891540" cy="1307592"/>
+          </a:xfrm>
+          <a:prstGeom prst="line">
+            <a:avLst/>
+          </a:prstGeom>
+          <a:noFill/>
+          <a:ln w="25400">
+            <a:solidFill>
+              <a:srgbClr val="94A3B8"/>
+            </a:solidFill>
+            <a:prstDash val="solid"/>
+          </a:ln>
+        </p:spPr>
+        <p:txBody>
+          <a:bodyPr/>
+          <a:lstStyle/>
+          <a:p>
+            <a:endParaRPr lang="en-US"/>
+          </a:p>
+        </p:txBody>
+      </p:sp>
+      <p:sp>
+        <p:nvSpPr>
+          <p:cNvPr id="95" name="TextBox 94">
+            <a:extLst>
+              <a:ext uri="{FF2B5EF4-FFF2-40B4-BE49-F238E27FC236}">
+                <a16:creationId xmlns:a16="http://schemas.microsoft.com/office/drawing/2014/main" id="{5D288413-00D7-513F-E42C-9634AB065A2C}"/>
+              </a:ext>
+            </a:extLst>
+          </p:cNvPr>
+          <p:cNvSpPr txBox="1"/>
+          <p:nvPr/>
+        </p:nvSpPr>
+        <p:spPr>
+          <a:xfrm>
+            <a:off x="2841850" y="3157628"/>
+            <a:ext cx="534220" cy="276999"/>
+          </a:xfrm>
+          <a:prstGeom prst="rect">
+            <a:avLst/>
+          </a:prstGeom>
+          <a:noFill/>
+        </p:spPr>
+        <p:txBody>
+          <a:bodyPr wrap="square" rtlCol="0">
+            <a:spAutoFit/>
+          </a:bodyPr>
+          <a:lstStyle/>
+          <a:p>
+            <a:r>
+              <a:rPr lang="en-US" sz="1200" b="1" dirty="0"/>
+              <a:t>MCP</a:t>
+            </a:r>
+          </a:p>
+        </p:txBody>
+      </p:sp>
+      <p:sp>
+        <p:nvSpPr>
+          <p:cNvPr id="110" name="TextBox 109">
+            <a:extLst>
+              <a:ext uri="{FF2B5EF4-FFF2-40B4-BE49-F238E27FC236}">
+                <a16:creationId xmlns:a16="http://schemas.microsoft.com/office/drawing/2014/main" id="{7B555EE3-45E8-5E93-20FD-39DDD716B47A}"/>
+              </a:ext>
+            </a:extLst>
+          </p:cNvPr>
+          <p:cNvSpPr txBox="1"/>
+          <p:nvPr/>
+        </p:nvSpPr>
+        <p:spPr>
+          <a:xfrm rot="3078319">
+            <a:off x="3097712" y="6088566"/>
+            <a:ext cx="1079398" cy="276999"/>
+          </a:xfrm>
+          <a:prstGeom prst="rect">
+            <a:avLst/>
+          </a:prstGeom>
+          <a:noFill/>
+        </p:spPr>
+        <p:txBody>
+          <a:bodyPr wrap="none" rtlCol="0">
+            <a:spAutoFit/>
+          </a:bodyPr>
+          <a:lstStyle/>
+          <a:p>
+            <a:r>
+              <a:rPr lang="en-US" sz="1200" dirty="0"/>
+              <a:t>Multi-tenants</a:t>
+            </a:r>
+          </a:p>
+        </p:txBody>
+      </p:sp>
+      <p:cxnSp>
+        <p:nvCxnSpPr>
+          <p:cNvPr id="112" name="Straight Arrow Connector 111">
+            <a:extLst>
+              <a:ext uri="{FF2B5EF4-FFF2-40B4-BE49-F238E27FC236}">
+                <a16:creationId xmlns:a16="http://schemas.microsoft.com/office/drawing/2014/main" id="{E9878E5B-D2FD-2C59-3DA9-CD37F764E523}"/>
+              </a:ext>
+            </a:extLst>
+          </p:cNvPr>
+          <p:cNvCxnSpPr>
+            <a:cxnSpLocks/>
+          </p:cNvCxnSpPr>
+          <p:nvPr/>
+        </p:nvCxnSpPr>
+        <p:spPr>
+          <a:xfrm>
+            <a:off x="3488732" y="5806440"/>
+            <a:ext cx="553212" cy="664984"/>
+          </a:xfrm>
+          <a:prstGeom prst="straightConnector1">
+            <a:avLst/>
+          </a:prstGeom>
+          <a:ln>
+            <a:solidFill>
+              <a:schemeClr val="bg1">
+                <a:lumMod val="65000"/>
+              </a:schemeClr>
+            </a:solidFill>
+            <a:tailEnd type="triangle"/>
+          </a:ln>
+        </p:spPr>
+        <p:style>
+          <a:lnRef idx="2">
+            <a:schemeClr val="accent1"/>
+          </a:lnRef>
+          <a:fillRef idx="0">
+            <a:schemeClr val="accent1"/>
+          </a:fillRef>
+          <a:effectRef idx="1">
+            <a:schemeClr val="accent1"/>
+          </a:effectRef>
+          <a:fontRef idx="minor">
+            <a:schemeClr val="tx1"/>
+          </a:fontRef>
+        </p:style>
+      </p:cxnSp>
+      <p:grpSp>
+        <p:nvGrpSpPr>
+          <p:cNvPr id="130" name="Group 129">
+            <a:extLst>
+              <a:ext uri="{FF2B5EF4-FFF2-40B4-BE49-F238E27FC236}">
+                <a16:creationId xmlns:a16="http://schemas.microsoft.com/office/drawing/2014/main" id="{04DE7DF5-2A8E-FB3E-9417-E684C035D4A1}"/>
+              </a:ext>
+            </a:extLst>
+          </p:cNvPr>
+          <p:cNvGrpSpPr/>
+          <p:nvPr/>
+        </p:nvGrpSpPr>
+        <p:grpSpPr>
+          <a:xfrm>
+            <a:off x="5458968" y="1927976"/>
+            <a:ext cx="2117316" cy="530352"/>
+            <a:chOff x="749808" y="356616"/>
+            <a:chExt cx="2117316" cy="530352"/>
+          </a:xfrm>
+        </p:grpSpPr>
+        <p:sp>
+          <p:nvSpPr>
+            <p:cNvPr id="116" name="Shape 26">
+              <a:extLst>
+                <a:ext uri="{FF2B5EF4-FFF2-40B4-BE49-F238E27FC236}">
+                  <a16:creationId xmlns:a16="http://schemas.microsoft.com/office/drawing/2014/main" id="{59AFC3B0-34B6-4177-AAC3-0CD1E72C1878}"/>
+                </a:ext>
+              </a:extLst>
+            </p:cNvPr>
+            <p:cNvSpPr/>
+            <p:nvPr/>
+          </p:nvSpPr>
+          <p:spPr>
+            <a:xfrm>
+              <a:off x="749808" y="356616"/>
+              <a:ext cx="1947672" cy="530352"/>
+            </a:xfrm>
+            <a:prstGeom prst="roundRect">
+              <a:avLst/>
+            </a:prstGeom>
+            <a:solidFill>
+              <a:srgbClr val="FFFFFF"/>
+            </a:solidFill>
+            <a:ln w="12700">
+              <a:solidFill>
+                <a:srgbClr val="CBD5E1"/>
+              </a:solidFill>
+              <a:prstDash val="solid"/>
+            </a:ln>
+            <a:effectLst>
+              <a:outerShdw blurRad="38100" dist="19050" dir="2700000" algn="bl" rotWithShape="0">
+                <a:srgbClr val="000000">
+                  <a:alpha val="18000"/>
+                </a:srgbClr>
+              </a:outerShdw>
+            </a:effectLst>
+          </p:spPr>
+          <p:txBody>
+            <a:bodyPr/>
+            <a:lstStyle/>
+            <a:p>
+              <a:endParaRPr lang="en-US" dirty="0"/>
+            </a:p>
+          </p:txBody>
+        </p:sp>
+        <p:sp>
+          <p:nvSpPr>
+            <p:cNvPr id="117" name="Shape 27">
+              <a:extLst>
+                <a:ext uri="{FF2B5EF4-FFF2-40B4-BE49-F238E27FC236}">
+                  <a16:creationId xmlns:a16="http://schemas.microsoft.com/office/drawing/2014/main" id="{08272C1B-7C99-80F4-6009-00507EE7FBBF}"/>
+                </a:ext>
+              </a:extLst>
+            </p:cNvPr>
+            <p:cNvSpPr/>
+            <p:nvPr/>
+          </p:nvSpPr>
+          <p:spPr>
+            <a:xfrm>
+              <a:off x="804672" y="502920"/>
+              <a:ext cx="356616" cy="329184"/>
+            </a:xfrm>
+            <a:prstGeom prst="roundRect">
+              <a:avLst/>
+            </a:prstGeom>
+            <a:solidFill>
+              <a:srgbClr val="EFF6FF"/>
+            </a:solidFill>
+            <a:ln w="12700">
+              <a:solidFill>
+                <a:srgbClr val="FFFFFF">
+                  <a:alpha val="0"/>
+                </a:srgbClr>
+              </a:solidFill>
+              <a:prstDash val="solid"/>
+            </a:ln>
+          </p:spPr>
+          <p:txBody>
+            <a:bodyPr/>
+            <a:lstStyle/>
+            <a:p>
+              <a:endParaRPr lang="en-US"/>
+            </a:p>
+          </p:txBody>
+        </p:sp>
+        <p:sp>
+          <p:nvSpPr>
+            <p:cNvPr id="119" name="Text 28">
+              <a:extLst>
+                <a:ext uri="{FF2B5EF4-FFF2-40B4-BE49-F238E27FC236}">
+                  <a16:creationId xmlns:a16="http://schemas.microsoft.com/office/drawing/2014/main" id="{76F9E285-9957-623E-1084-932243D5A3D9}"/>
+                </a:ext>
+              </a:extLst>
+            </p:cNvPr>
+            <p:cNvSpPr/>
+            <p:nvPr/>
+          </p:nvSpPr>
+          <p:spPr>
+            <a:xfrm>
+              <a:off x="1142999" y="457200"/>
+              <a:ext cx="1691640" cy="274320"/>
+            </a:xfrm>
+            <a:prstGeom prst="rect">
+              <a:avLst/>
+            </a:prstGeom>
+            <a:noFill/>
+            <a:ln/>
+          </p:spPr>
+          <p:txBody>
+            <a:bodyPr wrap="square" rtlCol="0" anchor="ctr"/>
+            <a:lstStyle/>
+            <a:p>
+              <a:pPr marL="0" indent="0">
+                <a:buNone/>
+              </a:pPr>
+              <a:r>
+                <a:rPr lang="en-US" sz="1500" b="1" dirty="0">
+                  <a:solidFill>
+                    <a:srgbClr val="111827"/>
+                  </a:solidFill>
+                  <a:latin typeface="Calibri" pitchFamily="34" charset="0"/>
+                  <a:ea typeface="Calibri" pitchFamily="34" charset="-122"/>
+                  <a:cs typeface="Calibri" pitchFamily="34" charset="-120"/>
+                </a:rPr>
+                <a:t>Agent Governance</a:t>
+              </a:r>
+              <a:endParaRPr lang="en-US" sz="1500" dirty="0"/>
+            </a:p>
+          </p:txBody>
+        </p:sp>
+        <p:sp>
+          <p:nvSpPr>
+            <p:cNvPr id="120" name="Text 29">
+              <a:extLst>
+                <a:ext uri="{FF2B5EF4-FFF2-40B4-BE49-F238E27FC236}">
+                  <a16:creationId xmlns:a16="http://schemas.microsoft.com/office/drawing/2014/main" id="{28B2659F-DADC-3535-0A81-8A764EF984D4}"/>
+                </a:ext>
+              </a:extLst>
+            </p:cNvPr>
+            <p:cNvSpPr/>
+            <p:nvPr/>
+          </p:nvSpPr>
+          <p:spPr>
+            <a:xfrm>
+              <a:off x="1175484" y="721895"/>
+              <a:ext cx="1691640" cy="91440"/>
+            </a:xfrm>
+            <a:prstGeom prst="rect">
+              <a:avLst/>
+            </a:prstGeom>
+            <a:noFill/>
+            <a:ln/>
+          </p:spPr>
+          <p:txBody>
+            <a:bodyPr wrap="square" rtlCol="0" anchor="ctr"/>
+            <a:lstStyle/>
+            <a:p>
+              <a:pPr marL="0" indent="0">
+                <a:buNone/>
+              </a:pPr>
+              <a:r>
+                <a:rPr lang="en-US" sz="1100" dirty="0">
+                  <a:solidFill>
+                    <a:srgbClr val="6B7280"/>
+                  </a:solidFill>
+                  <a:latin typeface="Calibri" pitchFamily="34" charset="0"/>
+                  <a:cs typeface="Calibri" pitchFamily="34" charset="-120"/>
+                </a:rPr>
+                <a:t>Configure Agentic RBAC</a:t>
+              </a:r>
+              <a:endParaRPr lang="en-US" sz="1100" dirty="0"/>
+            </a:p>
+          </p:txBody>
+        </p:sp>
+        <p:pic>
+          <p:nvPicPr>
+            <p:cNvPr id="121" name="Image 4" descr="/mnt/data/agentic_icons/key.png">
+              <a:extLst>
+                <a:ext uri="{FF2B5EF4-FFF2-40B4-BE49-F238E27FC236}">
+                  <a16:creationId xmlns:a16="http://schemas.microsoft.com/office/drawing/2014/main" id="{D4275CAD-61BE-05B2-C708-2DCF2C9D0954}"/>
+                </a:ext>
+              </a:extLst>
+            </p:cNvPr>
+            <p:cNvPicPr>
+              <a:picLocks noChangeAspect="1"/>
+            </p:cNvPicPr>
+            <p:nvPr/>
+          </p:nvPicPr>
+          <p:blipFill>
+            <a:blip r:embed="rId6"/>
+            <a:stretch>
+              <a:fillRect/>
+            </a:stretch>
+          </p:blipFill>
+          <p:spPr>
+            <a:xfrm>
+              <a:off x="882396" y="569390"/>
+              <a:ext cx="237744" cy="237744"/>
+            </a:xfrm>
+            <a:prstGeom prst="rect">
+              <a:avLst/>
+            </a:prstGeom>
+          </p:spPr>
+        </p:pic>
+      </p:grpSp>
+    </p:spTree>
+  </p:cSld>
+  <p:clrMapOvr>
+    <a:masterClrMapping/>
+  </p:clrMapOvr>
+</p:sld>
+</file>
+
+<file path=ppt/slides/slide3.xml><?xml version="1.0" encoding="utf-8"?>
+<p:sld xmlns:a="http://schemas.openxmlformats.org/drawingml/2006/main" xmlns:r="http://schemas.openxmlformats.org/officeDocument/2006/relationships" xmlns:p="http://schemas.openxmlformats.org/presentationml/2006/main">
+  <p:cSld>
+    <p:spTree>
+      <p:nvGrpSpPr>
+        <p:cNvPr id="1" name=""/>
+        <p:cNvGrpSpPr/>
+        <p:nvPr/>
+      </p:nvGrpSpPr>
+      <p:grpSpPr>
+        <a:xfrm>
+          <a:off x="0" y="0"/>
+          <a:ext cx="0" cy="0"/>
+          <a:chOff x="0" y="0"/>
+          <a:chExt cx="0" cy="0"/>
+        </a:xfrm>
+      </p:grpSpPr>
+      <p:pic>
+        <p:nvPicPr>
+          <p:cNvPr id="8" name="Picture 7">
+            <a:extLst>
+              <a:ext uri="{FF2B5EF4-FFF2-40B4-BE49-F238E27FC236}">
+                <a16:creationId xmlns:a16="http://schemas.microsoft.com/office/drawing/2014/main" id="{992D06AD-110F-EC65-552C-D7805207206B}"/>
+              </a:ext>
+            </a:extLst>
+          </p:cNvPr>
+          <p:cNvPicPr>
+            <a:picLocks noChangeAspect="1"/>
+          </p:cNvPicPr>
+          <p:nvPr/>
+        </p:nvPicPr>
+        <p:blipFill>
+          <a:blip r:embed="rId2"/>
+          <a:stretch>
+            <a:fillRect/>
+          </a:stretch>
+        </p:blipFill>
+        <p:spPr>
+          <a:xfrm>
+            <a:off x="825500" y="1173755"/>
+            <a:ext cx="7772400" cy="4032976"/>
+          </a:xfrm>
+          <a:prstGeom prst="rect">
+            <a:avLst/>
+          </a:prstGeom>
+          <a:ln>
+            <a:solidFill>
+              <a:srgbClr val="D2D2D2"/>
+            </a:solidFill>
+          </a:ln>
+        </p:spPr>
+      </p:pic>
+      <p:pic>
+        <p:nvPicPr>
+          <p:cNvPr id="5" name="Picture 4">
+            <a:extLst>
+              <a:ext uri="{FF2B5EF4-FFF2-40B4-BE49-F238E27FC236}">
+                <a16:creationId xmlns:a16="http://schemas.microsoft.com/office/drawing/2014/main" id="{0E4AA6CB-276F-400F-39FA-F82B68F3D63E}"/>
+              </a:ext>
+            </a:extLst>
+          </p:cNvPr>
+          <p:cNvPicPr>
+            <a:picLocks noChangeAspect="1"/>
+          </p:cNvPicPr>
+          <p:nvPr/>
+        </p:nvPicPr>
+        <p:blipFill>
+          <a:blip r:embed="rId3"/>
+          <a:stretch>
+            <a:fillRect/>
+          </a:stretch>
+        </p:blipFill>
+        <p:spPr>
+          <a:xfrm>
+            <a:off x="2019300" y="1341383"/>
+            <a:ext cx="7772400" cy="4342862"/>
+          </a:xfrm>
+          <a:prstGeom prst="rect">
+            <a:avLst/>
+          </a:prstGeom>
+          <a:ln>
+            <a:solidFill>
+              <a:srgbClr val="D2D2D2"/>
+            </a:solidFill>
+          </a:ln>
+        </p:spPr>
+      </p:pic>
+      <p:sp>
+        <p:nvSpPr>
+          <p:cNvPr id="7" name="TextBox 6">
+            <a:extLst>
+              <a:ext uri="{FF2B5EF4-FFF2-40B4-BE49-F238E27FC236}">
+                <a16:creationId xmlns:a16="http://schemas.microsoft.com/office/drawing/2014/main" id="{244D8728-F475-8A15-FB88-591D02482C19}"/>
+              </a:ext>
+            </a:extLst>
+          </p:cNvPr>
+          <p:cNvSpPr txBox="1"/>
+          <p:nvPr/>
+        </p:nvSpPr>
+        <p:spPr>
+          <a:xfrm>
+            <a:off x="2222500" y="203200"/>
+            <a:ext cx="7366000" cy="369332"/>
+          </a:xfrm>
+          <a:prstGeom prst="rect">
+            <a:avLst/>
+          </a:prstGeom>
+          <a:noFill/>
+        </p:spPr>
+        <p:txBody>
+          <a:bodyPr wrap="square" rtlCol="0">
+            <a:spAutoFit/>
+          </a:bodyPr>
+          <a:lstStyle/>
+          <a:p>
+            <a:pPr algn="ctr"/>
+            <a:r>
+              <a:rPr lang="en-US" b="1" dirty="0"/>
+              <a:t>Agent Studio – Agent Management &amp; Agentic Skill Acquisition</a:t>
+            </a:r>
+          </a:p>
+        </p:txBody>
+      </p:sp>
+    </p:spTree>
+    <p:extLst>
+      <p:ext uri="{BB962C8B-B14F-4D97-AF65-F5344CB8AC3E}">
+        <p14:creationId xmlns:p14="http://schemas.microsoft.com/office/powerpoint/2010/main" val="2512594015"/>
+      </p:ext>
+    </p:extLst>
+  </p:cSld>
+  <p:clrMapOvr>
+    <a:masterClrMapping/>
+  </p:clrMapOvr>
+</p:sld>
+</file>
+
+<file path=ppt/slides/slide4.xml><?xml version="1.0" encoding="utf-8"?>
+<p:sld xmlns:a="http://schemas.openxmlformats.org/drawingml/2006/main" xmlns:r="http://schemas.openxmlformats.org/officeDocument/2006/relationships" xmlns:p="http://schemas.openxmlformats.org/presentationml/2006/main">
+  <p:cSld>
+    <p:spTree>
+      <p:nvGrpSpPr>
+        <p:cNvPr id="1" name=""/>
+        <p:cNvGrpSpPr/>
+        <p:nvPr/>
+      </p:nvGrpSpPr>
+      <p:grpSpPr>
+        <a:xfrm>
+          <a:off x="0" y="0"/>
+          <a:ext cx="0" cy="0"/>
+          <a:chOff x="0" y="0"/>
+          <a:chExt cx="0" cy="0"/>
+        </a:xfrm>
+      </p:grpSpPr>
+      <p:pic>
+        <p:nvPicPr>
+          <p:cNvPr id="4" name="Picture 3">
+            <a:extLst>
+              <a:ext uri="{FF2B5EF4-FFF2-40B4-BE49-F238E27FC236}">
+                <a16:creationId xmlns:a16="http://schemas.microsoft.com/office/drawing/2014/main" id="{19E40A0A-2849-F450-9A22-815AA0AAD8AA}"/>
+              </a:ext>
+            </a:extLst>
+          </p:cNvPr>
+          <p:cNvPicPr>
+            <a:picLocks noChangeAspect="1"/>
+          </p:cNvPicPr>
+          <p:nvPr/>
+        </p:nvPicPr>
+        <p:blipFill>
+          <a:blip r:embed="rId2"/>
+          <a:stretch>
+            <a:fillRect/>
+          </a:stretch>
+        </p:blipFill>
+        <p:spPr>
+          <a:xfrm>
+            <a:off x="1854201" y="51521"/>
+            <a:ext cx="7823199" cy="6754957"/>
+          </a:xfrm>
+          <a:prstGeom prst="rect">
+            <a:avLst/>
+          </a:prstGeom>
+        </p:spPr>
+      </p:pic>
+    </p:spTree>
+    <p:extLst>
+      <p:ext uri="{BB962C8B-B14F-4D97-AF65-F5344CB8AC3E}">
+        <p14:creationId xmlns:p14="http://schemas.microsoft.com/office/powerpoint/2010/main" val="426881880"/>
+      </p:ext>
+    </p:extLst>
+  </p:cSld>
+  <p:clrMapOvr>
+    <a:masterClrMapping/>
+  </p:clrMapOvr>
+</p:sld>
+</file>
+
+<file path=ppt/slides/slide5.xml><?xml version="1.0" encoding="utf-8"?>
+<p:sld xmlns:a="http://schemas.openxmlformats.org/drawingml/2006/main" xmlns:r="http://schemas.openxmlformats.org/officeDocument/2006/relationships" xmlns:p="http://schemas.openxmlformats.org/presentationml/2006/main">
+  <p:cSld>
+    <p:spTree>
+      <p:nvGrpSpPr>
+        <p:cNvPr id="1" name=""/>
+        <p:cNvGrpSpPr/>
+        <p:nvPr/>
+      </p:nvGrpSpPr>
+      <p:grpSpPr>
+        <a:xfrm>
+          <a:off x="0" y="0"/>
+          <a:ext cx="0" cy="0"/>
+          <a:chOff x="0" y="0"/>
+          <a:chExt cx="0" cy="0"/>
+        </a:xfrm>
+      </p:grpSpPr>
+      <p:pic>
+        <p:nvPicPr>
+          <p:cNvPr id="4" name="Picture 3">
+            <a:extLst>
+              <a:ext uri="{FF2B5EF4-FFF2-40B4-BE49-F238E27FC236}">
+                <a16:creationId xmlns:a16="http://schemas.microsoft.com/office/drawing/2014/main" id="{8A28427C-3653-A08B-30D5-62F595FE9CA3}"/>
+              </a:ext>
+            </a:extLst>
+          </p:cNvPr>
+          <p:cNvPicPr>
+            <a:picLocks noChangeAspect="1"/>
+          </p:cNvPicPr>
+          <p:nvPr/>
+        </p:nvPicPr>
+        <p:blipFill>
+          <a:blip r:embed="rId2"/>
+          <a:stretch>
+            <a:fillRect/>
+          </a:stretch>
+        </p:blipFill>
+        <p:spPr>
+          <a:xfrm>
+            <a:off x="389335" y="285750"/>
+            <a:ext cx="11802665" cy="6286500"/>
+          </a:xfrm>
+          <a:prstGeom prst="rect">
+            <a:avLst/>
+          </a:prstGeom>
+        </p:spPr>
+      </p:pic>
+    </p:spTree>
+    <p:extLst>
+      <p:ext uri="{BB962C8B-B14F-4D97-AF65-F5344CB8AC3E}">
+        <p14:creationId xmlns:p14="http://schemas.microsoft.com/office/powerpoint/2010/main" val="4069971337"/>
+      </p:ext>
+    </p:extLst>
+  </p:cSld>
+  <p:clrMapOvr>
+    <a:masterClrMapping/>
+  </p:clrMapOvr>
+</p:sld>
+</file>
+
+<file path=ppt/slides/slide6.xml><?xml version="1.0" encoding="utf-8"?>
+<p:sld xmlns:a="http://schemas.openxmlformats.org/drawingml/2006/main" xmlns:r="http://schemas.openxmlformats.org/officeDocument/2006/relationships" xmlns:p="http://schemas.openxmlformats.org/presentationml/2006/main">
+  <p:cSld>
+    <p:spTree>
+      <p:nvGrpSpPr>
+        <p:cNvPr id="1" name=""/>
+        <p:cNvGrpSpPr/>
+        <p:nvPr/>
+      </p:nvGrpSpPr>
+      <p:grpSpPr>
+        <a:xfrm>
+          <a:off x="0" y="0"/>
+          <a:ext cx="0" cy="0"/>
+          <a:chOff x="0" y="0"/>
+          <a:chExt cx="0" cy="0"/>
+        </a:xfrm>
+      </p:grpSpPr>
+      <p:pic>
+        <p:nvPicPr>
+          <p:cNvPr id="4" name="Picture 3">
+            <a:extLst>
+              <a:ext uri="{FF2B5EF4-FFF2-40B4-BE49-F238E27FC236}">
+                <a16:creationId xmlns:a16="http://schemas.microsoft.com/office/drawing/2014/main" id="{A4A80ECD-4B0B-F9EF-E82E-EEE861B7A905}"/>
+              </a:ext>
+            </a:extLst>
+          </p:cNvPr>
+          <p:cNvPicPr>
+            <a:picLocks noChangeAspect="1"/>
+          </p:cNvPicPr>
+          <p:nvPr/>
+        </p:nvPicPr>
+        <p:blipFill>
+          <a:blip r:embed="rId2"/>
+          <a:stretch>
+            <a:fillRect/>
+          </a:stretch>
+        </p:blipFill>
+        <p:spPr>
+          <a:xfrm>
+            <a:off x="520140" y="533400"/>
+            <a:ext cx="11341211" cy="6184900"/>
+          </a:xfrm>
+          <a:prstGeom prst="rect">
+            <a:avLst/>
+          </a:prstGeom>
+        </p:spPr>
+      </p:pic>
+      <p:sp>
+        <p:nvSpPr>
+          <p:cNvPr id="5" name="TextBox 4">
+            <a:extLst>
+              <a:ext uri="{FF2B5EF4-FFF2-40B4-BE49-F238E27FC236}">
+                <a16:creationId xmlns:a16="http://schemas.microsoft.com/office/drawing/2014/main" id="{34EAFD3B-D260-79D0-B696-C81BA91234BE}"/>
+              </a:ext>
+            </a:extLst>
+          </p:cNvPr>
+          <p:cNvSpPr txBox="1"/>
+          <p:nvPr/>
+        </p:nvSpPr>
+        <p:spPr>
+          <a:xfrm>
+            <a:off x="4152900" y="139700"/>
+            <a:ext cx="2705100" cy="461665"/>
+          </a:xfrm>
+          <a:prstGeom prst="rect">
+            <a:avLst/>
+          </a:prstGeom>
+          <a:noFill/>
+        </p:spPr>
+        <p:txBody>
+          <a:bodyPr wrap="square" rtlCol="0">
+            <a:spAutoFit/>
+          </a:bodyPr>
+          <a:lstStyle/>
+          <a:p>
+            <a:pPr algn="ctr"/>
+            <a:r>
+              <a:rPr lang="en-US" sz="2400" b="1" dirty="0"/>
+              <a:t>Agent Chat</a:t>
+            </a:r>
+          </a:p>
+        </p:txBody>
+      </p:sp>
+    </p:spTree>
+    <p:extLst>
+      <p:ext uri="{BB962C8B-B14F-4D97-AF65-F5344CB8AC3E}">
+        <p14:creationId xmlns:p14="http://schemas.microsoft.com/office/powerpoint/2010/main" val="4001283427"/>
+      </p:ext>
+    </p:extLst>
+  </p:cSld>
+  <p:clrMapOvr>
+    <a:masterClrMapping/>
+  </p:clrMapOvr>
+</p:sld>
+</file>
+
 <file path=ppt/theme/theme1.xml><?xml version="1.0" encoding="utf-8"?>
 <a:theme xmlns:a="http://schemas.openxmlformats.org/drawingml/2006/main" name="Office Theme">
   <a:themeElements>
@@ -8497,4 +13008,319 @@
     </a:ext>
   </a:extLst>
 </a:theme>
+</file>
+
+<file path=ppt/theme/theme2.xml><?xml version="1.0" encoding="utf-8"?>
+<a:theme xmlns:a="http://schemas.openxmlformats.org/drawingml/2006/main" name="Office Theme">
+  <a:themeElements>
+    <a:clrScheme name="Office">
+      <a:dk1>
+        <a:sysClr val="windowText" lastClr="000000"/>
+      </a:dk1>
+      <a:lt1>
+        <a:sysClr val="window" lastClr="FFFFFF"/>
+      </a:lt1>
+      <a:dk2>
+        <a:srgbClr val="0E2841"/>
+      </a:dk2>
+      <a:lt2>
+        <a:srgbClr val="E8E8E8"/>
+      </a:lt2>
+      <a:accent1>
+        <a:srgbClr val="156082"/>
+      </a:accent1>
+      <a:accent2>
+        <a:srgbClr val="E97132"/>
+      </a:accent2>
+      <a:accent3>
+        <a:srgbClr val="196B24"/>
+      </a:accent3>
+      <a:accent4>
+        <a:srgbClr val="0F9ED5"/>
+      </a:accent4>
+      <a:accent5>
+        <a:srgbClr val="A02B93"/>
+      </a:accent5>
+      <a:accent6>
+        <a:srgbClr val="4EA72E"/>
+      </a:accent6>
+      <a:hlink>
+        <a:srgbClr val="467886"/>
+      </a:hlink>
+      <a:folHlink>
+        <a:srgbClr val="96607D"/>
+      </a:folHlink>
+    </a:clrScheme>
+    <a:fontScheme name="Office">
+      <a:majorFont>
+        <a:latin typeface="Aptos Display" panose="02110004020202020204"/>
+        <a:ea typeface=""/>
+        <a:cs typeface=""/>
+        <a:font script="Jpan" typeface="游ゴシック Light"/>
+        <a:font script="Hang" typeface="맑은 고딕"/>
+        <a:font script="Hans" typeface="等线 Light"/>
+        <a:font script="Hant" typeface="新細明體"/>
+        <a:font script="Arab" typeface="Times New Roman"/>
+        <a:font script="Hebr" typeface="Times New Roman"/>
+        <a:font script="Thai" typeface="Angsana New"/>
+        <a:font script="Ethi" typeface="Nyala"/>
+        <a:font script="Beng" typeface="Vrinda"/>
+        <a:font script="Gujr" typeface="Shruti"/>
+        <a:font script="Khmr" typeface="MoolBoran"/>
+        <a:font script="Knda" typeface="Tunga"/>
+        <a:font script="Guru" typeface="Raavi"/>
+        <a:font script="Cans" typeface="Euphemia"/>
+        <a:font script="Cher" typeface="Plantagenet Cherokee"/>
+        <a:font script="Yiii" typeface="Microsoft Yi Baiti"/>
+        <a:font script="Tibt" typeface="Microsoft Himalaya"/>
+        <a:font script="Thaa" typeface="MV Boli"/>
+        <a:font script="Deva" typeface="Mangal"/>
+        <a:font script="Telu" typeface="Gautami"/>
+        <a:font script="Taml" typeface="Latha"/>
+        <a:font script="Syrc" typeface="Estrangelo Edessa"/>
+        <a:font script="Orya" typeface="Kalinga"/>
+        <a:font script="Mlym" typeface="Kartika"/>
+        <a:font script="Laoo" typeface="DokChampa"/>
+        <a:font script="Sinh" typeface="Iskoola Pota"/>
+        <a:font script="Mong" typeface="Mongolian Baiti"/>
+        <a:font script="Viet" typeface="Times New Roman"/>
+        <a:font script="Uigh" typeface="Microsoft Uighur"/>
+        <a:font script="Geor" typeface="Sylfaen"/>
+        <a:font script="Armn" typeface="Arial"/>
+        <a:font script="Bugi" typeface="Leelawadee UI"/>
+        <a:font script="Bopo" typeface="Microsoft JhengHei"/>
+        <a:font script="Java" typeface="Javanese Text"/>
+        <a:font script="Lisu" typeface="Segoe UI"/>
+        <a:font script="Mymr" typeface="Myanmar Text"/>
+        <a:font script="Nkoo" typeface="Ebrima"/>
+        <a:font script="Olck" typeface="Nirmala UI"/>
+        <a:font script="Osma" typeface="Ebrima"/>
+        <a:font script="Phag" typeface="Phagspa"/>
+        <a:font script="Syrn" typeface="Estrangelo Edessa"/>
+        <a:font script="Syrj" typeface="Estrangelo Edessa"/>
+        <a:font script="Syre" typeface="Estrangelo Edessa"/>
+        <a:font script="Sora" typeface="Nirmala UI"/>
+        <a:font script="Tale" typeface="Microsoft Tai Le"/>
+        <a:font script="Talu" typeface="Microsoft New Tai Lue"/>
+        <a:font script="Tfng" typeface="Ebrima"/>
+      </a:majorFont>
+      <a:minorFont>
+        <a:latin typeface="Aptos" panose="02110004020202020204"/>
+        <a:ea typeface=""/>
+        <a:cs typeface=""/>
+        <a:font script="Jpan" typeface="游ゴシック"/>
+        <a:font script="Hang" typeface="맑은 고딕"/>
+        <a:font script="Hans" typeface="等线"/>
+        <a:font script="Hant" typeface="新細明體"/>
+        <a:font script="Arab" typeface="Arial"/>
+        <a:font script="Hebr" typeface="Arial"/>
+        <a:font script="Thai" typeface="Cordia New"/>
+        <a:font script="Ethi" typeface="Nyala"/>
+        <a:font script="Beng" typeface="Vrinda"/>
+        <a:font script="Gujr" typeface="Shruti"/>
+        <a:font script="Khmr" typeface="DaunPenh"/>
+        <a:font script="Knda" typeface="Tunga"/>
+        <a:font script="Guru" typeface="Raavi"/>
+        <a:font script="Cans" typeface="Euphemia"/>
+        <a:font script="Cher" typeface="Plantagenet Cherokee"/>
+        <a:font script="Yiii" typeface="Microsoft Yi Baiti"/>
+        <a:font script="Tibt" typeface="Microsoft Himalaya"/>
+        <a:font script="Thaa" typeface="MV Boli"/>
+        <a:font script="Deva" typeface="Mangal"/>
+        <a:font script="Telu" typeface="Gautami"/>
+        <a:font script="Taml" typeface="Latha"/>
+        <a:font script="Syrc" typeface="Estrangelo Edessa"/>
+        <a:font script="Orya" typeface="Kalinga"/>
+        <a:font script="Mlym" typeface="Kartika"/>
+        <a:font script="Laoo" typeface="DokChampa"/>
+        <a:font script="Sinh" typeface="Iskoola Pota"/>
+        <a:font script="Mong" typeface="Mongolian Baiti"/>
+        <a:font script="Viet" typeface="Arial"/>
+        <a:font script="Uigh" typeface="Microsoft Uighur"/>
+        <a:font script="Geor" typeface="Sylfaen"/>
+        <a:font script="Armn" typeface="Arial"/>
+        <a:font script="Bugi" typeface="Leelawadee UI"/>
+        <a:font script="Bopo" typeface="Microsoft JhengHei"/>
+        <a:font script="Java" typeface="Javanese Text"/>
+        <a:font script="Lisu" typeface="Segoe UI"/>
+        <a:font script="Mymr" typeface="Myanmar Text"/>
+        <a:font script="Nkoo" typeface="Ebrima"/>
+        <a:font script="Olck" typeface="Nirmala UI"/>
+        <a:font script="Osma" typeface="Ebrima"/>
+        <a:font script="Phag" typeface="Phagspa"/>
+        <a:font script="Syrn" typeface="Estrangelo Edessa"/>
+        <a:font script="Syrj" typeface="Estrangelo Edessa"/>
+        <a:font script="Syre" typeface="Estrangelo Edessa"/>
+        <a:font script="Sora" typeface="Nirmala UI"/>
+        <a:font script="Tale" typeface="Microsoft Tai Le"/>
+        <a:font script="Talu" typeface="Microsoft New Tai Lue"/>
+        <a:font script="Tfng" typeface="Ebrima"/>
+      </a:minorFont>
+    </a:fontScheme>
+    <a:fmtScheme name="Office">
+      <a:fillStyleLst>
+        <a:solidFill>
+          <a:schemeClr val="phClr"/>
+        </a:solidFill>
+        <a:gradFill rotWithShape="1">
+          <a:gsLst>
+            <a:gs pos="0">
+              <a:schemeClr val="phClr">
+                <a:lumMod val="110000"/>
+                <a:satMod val="105000"/>
+                <a:tint val="67000"/>
+              </a:schemeClr>
+            </a:gs>
+            <a:gs pos="50000">
+              <a:schemeClr val="phClr">
+                <a:lumMod val="105000"/>
+                <a:satMod val="103000"/>
+                <a:tint val="73000"/>
+              </a:schemeClr>
+            </a:gs>
+            <a:gs pos="100000">
+              <a:schemeClr val="phClr">
+                <a:lumMod val="105000"/>
+                <a:satMod val="109000"/>
+                <a:tint val="81000"/>
+              </a:schemeClr>
+            </a:gs>
+          </a:gsLst>
+          <a:lin ang="5400000" scaled="0"/>
+        </a:gradFill>
+        <a:gradFill rotWithShape="1">
+          <a:gsLst>
+            <a:gs pos="0">
+              <a:schemeClr val="phClr">
+                <a:satMod val="103000"/>
+                <a:lumMod val="102000"/>
+                <a:tint val="94000"/>
+              </a:schemeClr>
+            </a:gs>
+            <a:gs pos="50000">
+              <a:schemeClr val="phClr">
+                <a:satMod val="110000"/>
+                <a:lumMod val="100000"/>
+                <a:shade val="100000"/>
+              </a:schemeClr>
+            </a:gs>
+            <a:gs pos="100000">
+              <a:schemeClr val="phClr">
+                <a:lumMod val="99000"/>
+                <a:satMod val="120000"/>
+                <a:shade val="78000"/>
+              </a:schemeClr>
+            </a:gs>
+          </a:gsLst>
+          <a:lin ang="5400000" scaled="0"/>
+        </a:gradFill>
+      </a:fillStyleLst>
+      <a:lnStyleLst>
+        <a:ln w="12700" cap="flat" cmpd="sng" algn="ctr">
+          <a:solidFill>
+            <a:schemeClr val="phClr"/>
+          </a:solidFill>
+          <a:prstDash val="solid"/>
+          <a:miter lim="800000"/>
+        </a:ln>
+        <a:ln w="19050" cap="flat" cmpd="sng" algn="ctr">
+          <a:solidFill>
+            <a:schemeClr val="phClr"/>
+          </a:solidFill>
+          <a:prstDash val="solid"/>
+          <a:miter lim="800000"/>
+        </a:ln>
+        <a:ln w="25400" cap="flat" cmpd="sng" algn="ctr">
+          <a:solidFill>
+            <a:schemeClr val="phClr"/>
+          </a:solidFill>
+          <a:prstDash val="solid"/>
+          <a:miter lim="800000"/>
+        </a:ln>
+      </a:lnStyleLst>
+      <a:effectStyleLst>
+        <a:effectStyle>
+          <a:effectLst/>
+        </a:effectStyle>
+        <a:effectStyle>
+          <a:effectLst/>
+        </a:effectStyle>
+        <a:effectStyle>
+          <a:effectLst>
+            <a:outerShdw blurRad="57150" dist="19050" dir="5400000" algn="ctr" rotWithShape="0">
+              <a:srgbClr val="000000">
+                <a:alpha val="63000"/>
+              </a:srgbClr>
+            </a:outerShdw>
+          </a:effectLst>
+        </a:effectStyle>
+      </a:effectStyleLst>
+      <a:bgFillStyleLst>
+        <a:solidFill>
+          <a:schemeClr val="phClr"/>
+        </a:solidFill>
+        <a:solidFill>
+          <a:schemeClr val="phClr">
+            <a:tint val="95000"/>
+            <a:satMod val="170000"/>
+          </a:schemeClr>
+        </a:solidFill>
+        <a:gradFill rotWithShape="1">
+          <a:gsLst>
+            <a:gs pos="0">
+              <a:schemeClr val="phClr">
+                <a:tint val="93000"/>
+                <a:satMod val="150000"/>
+                <a:shade val="98000"/>
+                <a:lumMod val="102000"/>
+              </a:schemeClr>
+            </a:gs>
+            <a:gs pos="50000">
+              <a:schemeClr val="phClr">
+                <a:tint val="98000"/>
+                <a:satMod val="130000"/>
+                <a:shade val="90000"/>
+                <a:lumMod val="103000"/>
+              </a:schemeClr>
+            </a:gs>
+            <a:gs pos="100000">
+              <a:schemeClr val="phClr">
+                <a:shade val="63000"/>
+                <a:satMod val="120000"/>
+              </a:schemeClr>
+            </a:gs>
+          </a:gsLst>
+          <a:lin ang="5400000" scaled="0"/>
+        </a:gradFill>
+      </a:bgFillStyleLst>
+    </a:fmtScheme>
+  </a:themeElements>
+  <a:objectDefaults>
+    <a:lnDef>
+      <a:spPr/>
+      <a:bodyPr/>
+      <a:lstStyle/>
+      <a:style>
+        <a:lnRef idx="2">
+          <a:schemeClr val="accent1"/>
+        </a:lnRef>
+        <a:fillRef idx="0">
+          <a:schemeClr val="accent1"/>
+        </a:fillRef>
+        <a:effectRef idx="1">
+          <a:schemeClr val="accent1"/>
+        </a:effectRef>
+        <a:fontRef idx="minor">
+          <a:schemeClr val="tx1"/>
+        </a:fontRef>
+      </a:style>
+    </a:lnDef>
+  </a:objectDefaults>
+  <a:extraClrSchemeLst/>
+  <a:extLst>
+    <a:ext uri="{05A4C25C-085E-4340-85A3-A5531E510DB2}">
+      <thm15:themeFamily xmlns:thm15="http://schemas.microsoft.com/office/thememl/2012/main" name="Office Theme" id="{2E142A2C-CD16-42D6-873A-C26D2A0506FA}" vid="{1BDDFF52-6CD6-40A5-AB3C-68EB2F1E4D0A}"/>
+    </a:ext>
+  </a:extLst>
+</a:theme>
 </file>
</xml_diff>